<commit_message>
Updated with better performance
</commit_message>
<xml_diff>
--- a/Final project/Final_presentation.pptx
+++ b/Final project/Final_presentation.pptx
@@ -9258,10 +9258,10 @@
       </p:sp>
       <p:pic>
         <p:nvPicPr>
-          <p:cNvPr id="5" name="Grafik 4">
+          <p:cNvPr id="6" name="Grafik 5">
             <a:extLst>
               <a:ext uri="{FF2B5EF4-FFF2-40B4-BE49-F238E27FC236}">
-                <a16:creationId xmlns:a16="http://schemas.microsoft.com/office/drawing/2014/main" id="{18F441BE-E328-47B4-B8B5-EC73D2E5CA26}"/>
+                <a16:creationId xmlns:a16="http://schemas.microsoft.com/office/drawing/2014/main" id="{86F8F682-83E4-45B8-8849-158AF40BEDB6}"/>
               </a:ext>
             </a:extLst>
           </p:cNvPr>
@@ -9278,37 +9278,7 @@
         </p:blipFill>
         <p:spPr>
           <a:xfrm>
-            <a:off x="-27594" y="4134375"/>
-            <a:ext cx="9144000" cy="2003495"/>
-          </a:xfrm>
-          <a:prstGeom prst="rect">
-            <a:avLst/>
-          </a:prstGeom>
-        </p:spPr>
-      </p:pic>
-      <p:pic>
-        <p:nvPicPr>
-          <p:cNvPr id="6" name="Grafik 5">
-            <a:extLst>
-              <a:ext uri="{FF2B5EF4-FFF2-40B4-BE49-F238E27FC236}">
-                <a16:creationId xmlns:a16="http://schemas.microsoft.com/office/drawing/2014/main" id="{86F8F682-83E4-45B8-8849-158AF40BEDB6}"/>
-              </a:ext>
-            </a:extLst>
-          </p:cNvPr>
-          <p:cNvPicPr>
-            <a:picLocks noChangeAspect="1"/>
-          </p:cNvPicPr>
-          <p:nvPr/>
-        </p:nvPicPr>
-        <p:blipFill>
-          <a:blip r:embed="rId4"/>
-          <a:stretch>
-            <a:fillRect/>
-          </a:stretch>
-        </p:blipFill>
-        <p:spPr>
-          <a:xfrm>
-            <a:off x="4544406" y="1421802"/>
+            <a:off x="4572000" y="1507027"/>
             <a:ext cx="4458608" cy="2340864"/>
           </a:xfrm>
           <a:prstGeom prst="rect">
@@ -9368,6 +9338,36 @@
           </a:p>
         </p:txBody>
       </p:sp>
+      <p:pic>
+        <p:nvPicPr>
+          <p:cNvPr id="7" name="Grafik 6">
+            <a:extLst>
+              <a:ext uri="{FF2B5EF4-FFF2-40B4-BE49-F238E27FC236}">
+                <a16:creationId xmlns:a16="http://schemas.microsoft.com/office/drawing/2014/main" id="{B9030065-C817-4017-A161-C834569DF93E}"/>
+              </a:ext>
+            </a:extLst>
+          </p:cNvPr>
+          <p:cNvPicPr>
+            <a:picLocks noChangeAspect="1"/>
+          </p:cNvPicPr>
+          <p:nvPr/>
+        </p:nvPicPr>
+        <p:blipFill>
+          <a:blip r:embed="rId4"/>
+          <a:stretch>
+            <a:fillRect/>
+          </a:stretch>
+        </p:blipFill>
+        <p:spPr>
+          <a:xfrm>
+            <a:off x="67583" y="4303430"/>
+            <a:ext cx="8963025" cy="1295400"/>
+          </a:xfrm>
+          <a:prstGeom prst="rect">
+            <a:avLst/>
+          </a:prstGeom>
+        </p:spPr>
+      </p:pic>
       <p:sp>
         <p:nvSpPr>
           <p:cNvPr id="9" name="Rechteck 8">
@@ -9382,7 +9382,7 @@
         </p:nvSpPr>
         <p:spPr>
           <a:xfrm>
-            <a:off x="8270789" y="4832200"/>
+            <a:off x="8254313" y="4472641"/>
             <a:ext cx="675503" cy="402946"/>
           </a:xfrm>
           <a:prstGeom prst="rect">
@@ -9417,6 +9417,78 @@
           <a:p>
             <a:pPr algn="ctr"/>
             <a:endParaRPr lang="de-DE"/>
+          </a:p>
+        </p:txBody>
+      </p:sp>
+      <p:sp>
+        <p:nvSpPr>
+          <p:cNvPr id="10" name="Textfeld 9">
+            <a:extLst>
+              <a:ext uri="{FF2B5EF4-FFF2-40B4-BE49-F238E27FC236}">
+                <a16:creationId xmlns:a16="http://schemas.microsoft.com/office/drawing/2014/main" id="{8662FAAF-7310-4EF2-8BE7-11E9012332D2}"/>
+              </a:ext>
+            </a:extLst>
+          </p:cNvPr>
+          <p:cNvSpPr txBox="1"/>
+          <p:nvPr/>
+        </p:nvSpPr>
+        <p:spPr>
+          <a:xfrm>
+            <a:off x="6002830" y="3852962"/>
+            <a:ext cx="2251483" cy="307777"/>
+          </a:xfrm>
+          <a:prstGeom prst="rect">
+            <a:avLst/>
+          </a:prstGeom>
+          <a:noFill/>
+        </p:spPr>
+        <p:txBody>
+          <a:bodyPr wrap="square" rtlCol="0">
+            <a:spAutoFit/>
+          </a:bodyPr>
+          <a:lstStyle/>
+          <a:p>
+            <a:r>
+              <a:rPr lang="en-US" sz="1400" dirty="0"/>
+              <a:t>Competition leaderboard</a:t>
+            </a:r>
+            <a:endParaRPr lang="de-DE" sz="1400" dirty="0"/>
+          </a:p>
+        </p:txBody>
+      </p:sp>
+      <p:sp>
+        <p:nvSpPr>
+          <p:cNvPr id="12" name="Textfeld 11">
+            <a:extLst>
+              <a:ext uri="{FF2B5EF4-FFF2-40B4-BE49-F238E27FC236}">
+                <a16:creationId xmlns:a16="http://schemas.microsoft.com/office/drawing/2014/main" id="{CD003098-49E7-43D2-BCEA-38898C7C4D3C}"/>
+              </a:ext>
+            </a:extLst>
+          </p:cNvPr>
+          <p:cNvSpPr txBox="1"/>
+          <p:nvPr/>
+        </p:nvSpPr>
+        <p:spPr>
+          <a:xfrm>
+            <a:off x="3296639" y="5471811"/>
+            <a:ext cx="2251483" cy="307777"/>
+          </a:xfrm>
+          <a:prstGeom prst="rect">
+            <a:avLst/>
+          </a:prstGeom>
+          <a:noFill/>
+        </p:spPr>
+        <p:txBody>
+          <a:bodyPr wrap="square" rtlCol="0">
+            <a:spAutoFit/>
+          </a:bodyPr>
+          <a:lstStyle/>
+          <a:p>
+            <a:r>
+              <a:rPr lang="en-US" sz="1400" dirty="0"/>
+              <a:t>Our best submission</a:t>
+            </a:r>
+            <a:endParaRPr lang="de-DE" sz="1400" dirty="0"/>
           </a:p>
         </p:txBody>
       </p:sp>
@@ -10420,21 +10492,21 @@
 </file>
 
 <file path=customXml/item2.xml><?xml version="1.0" encoding="utf-8"?>
+<p:properties xmlns:p="http://schemas.microsoft.com/office/2006/metadata/properties" xmlns:xsi="http://www.w3.org/2001/XMLSchema-instance" xmlns:pc="http://schemas.microsoft.com/office/infopath/2007/PartnerControls">
+  <documentManagement>
+    <Status xmlns="71af3243-3dd4-4a8d-8c0d-dd76da1f02a5">Not started</Status>
+    <MediaServiceKeyPoints xmlns="71af3243-3dd4-4a8d-8c0d-dd76da1f02a5" xsi:nil="true"/>
+  </documentManagement>
+</p:properties>
+</file>
+
+<file path=customXml/item3.xml><?xml version="1.0" encoding="utf-8"?>
 <?mso-contentType ?>
 <FormTemplates xmlns="http://schemas.microsoft.com/sharepoint/v3/contenttype/forms">
   <Display>DocumentLibraryForm</Display>
   <Edit>DocumentLibraryForm</Edit>
   <New>DocumentLibraryForm</New>
 </FormTemplates>
-</file>
-
-<file path=customXml/item3.xml><?xml version="1.0" encoding="utf-8"?>
-<p:properties xmlns:p="http://schemas.microsoft.com/office/2006/metadata/properties" xmlns:xsi="http://www.w3.org/2001/XMLSchema-instance" xmlns:pc="http://schemas.microsoft.com/office/infopath/2007/PartnerControls">
-  <documentManagement>
-    <Status xmlns="71af3243-3dd4-4a8d-8c0d-dd76da1f02a5">Not started</Status>
-    <MediaServiceKeyPoints xmlns="71af3243-3dd4-4a8d-8c0d-dd76da1f02a5" xsi:nil="true"/>
-  </documentManagement>
-</p:properties>
 </file>
 
 <file path=customXml/itemProps1.xml><?xml version="1.0" encoding="utf-8"?>
@@ -10457,14 +10529,6 @@
 </file>
 
 <file path=customXml/itemProps2.xml><?xml version="1.0" encoding="utf-8"?>
-<ds:datastoreItem xmlns:ds="http://schemas.openxmlformats.org/officeDocument/2006/customXml" ds:itemID="{7EE8C63A-4744-4DE4-BB49-0FF0B5375C60}">
-  <ds:schemaRefs>
-    <ds:schemaRef ds:uri="http://schemas.microsoft.com/sharepoint/v3/contenttype/forms"/>
-  </ds:schemaRefs>
-</ds:datastoreItem>
-</file>
-
-<file path=customXml/itemProps3.xml><?xml version="1.0" encoding="utf-8"?>
 <ds:datastoreItem xmlns:ds="http://schemas.openxmlformats.org/officeDocument/2006/customXml" ds:itemID="{950072C5-DDE0-4258-BA7A-4D4B80DFA632}">
   <ds:schemaRefs>
     <ds:schemaRef ds:uri="http://purl.org/dc/elements/1.1/"/>
@@ -10479,4 +10543,12 @@
     <ds:schemaRef ds:uri="http://www.w3.org/XML/1998/namespace"/>
   </ds:schemaRefs>
 </ds:datastoreItem>
+</file>
+
+<file path=customXml/itemProps3.xml><?xml version="1.0" encoding="utf-8"?>
+<ds:datastoreItem xmlns:ds="http://schemas.openxmlformats.org/officeDocument/2006/customXml" ds:itemID="{7EE8C63A-4744-4DE4-BB49-0FF0B5375C60}">
+  <ds:schemaRefs>
+    <ds:schemaRef ds:uri="http://schemas.microsoft.com/sharepoint/v3/contenttype/forms"/>
+  </ds:schemaRefs>
+</ds:datastoreItem>
 </file>
</xml_diff>

<commit_message>
Moved challenges section to the introduction
</commit_message>
<xml_diff>
--- a/Final project/Final_presentation.pptx
+++ b/Final project/Final_presentation.pptx
@@ -16,12 +16,12 @@
     <p:sldId id="291" r:id="rId7"/>
     <p:sldId id="300" r:id="rId8"/>
     <p:sldId id="306" r:id="rId9"/>
-    <p:sldId id="292" r:id="rId10"/>
-    <p:sldId id="305" r:id="rId11"/>
-    <p:sldId id="293" r:id="rId12"/>
-    <p:sldId id="301" r:id="rId13"/>
-    <p:sldId id="303" r:id="rId14"/>
-    <p:sldId id="296" r:id="rId15"/>
+    <p:sldId id="307" r:id="rId10"/>
+    <p:sldId id="292" r:id="rId11"/>
+    <p:sldId id="305" r:id="rId12"/>
+    <p:sldId id="293" r:id="rId13"/>
+    <p:sldId id="301" r:id="rId14"/>
+    <p:sldId id="303" r:id="rId15"/>
     <p:sldId id="302" r:id="rId16"/>
     <p:sldId id="297" r:id="rId17"/>
     <p:sldId id="299" r:id="rId18"/>
@@ -879,7 +879,7 @@
     </p:spTree>
     <p:extLst>
       <p:ext uri="{BB962C8B-B14F-4D97-AF65-F5344CB8AC3E}">
-        <p14:creationId xmlns:p14="http://schemas.microsoft.com/office/powerpoint/2010/main" val="1535124313"/>
+        <p14:creationId xmlns:p14="http://schemas.microsoft.com/office/powerpoint/2010/main" val="2891194745"/>
       </p:ext>
     </p:extLst>
   </p:cSld>
@@ -972,7 +972,7 @@
     </p:spTree>
     <p:extLst>
       <p:ext uri="{BB962C8B-B14F-4D97-AF65-F5344CB8AC3E}">
-        <p14:creationId xmlns:p14="http://schemas.microsoft.com/office/powerpoint/2010/main" val="2943361062"/>
+        <p14:creationId xmlns:p14="http://schemas.microsoft.com/office/powerpoint/2010/main" val="1535124313"/>
       </p:ext>
     </p:extLst>
   </p:cSld>
@@ -1716,7 +1716,7 @@
     </p:spTree>
     <p:extLst>
       <p:ext uri="{BB962C8B-B14F-4D97-AF65-F5344CB8AC3E}">
-        <p14:creationId xmlns:p14="http://schemas.microsoft.com/office/powerpoint/2010/main" val="2887393335"/>
+        <p14:creationId xmlns:p14="http://schemas.microsoft.com/office/powerpoint/2010/main" val="675472047"/>
       </p:ext>
     </p:extLst>
   </p:cSld>
@@ -1809,7 +1809,7 @@
     </p:spTree>
     <p:extLst>
       <p:ext uri="{BB962C8B-B14F-4D97-AF65-F5344CB8AC3E}">
-        <p14:creationId xmlns:p14="http://schemas.microsoft.com/office/powerpoint/2010/main" val="590974281"/>
+        <p14:creationId xmlns:p14="http://schemas.microsoft.com/office/powerpoint/2010/main" val="2887393335"/>
       </p:ext>
     </p:extLst>
   </p:cSld>
@@ -1902,7 +1902,7 @@
     </p:spTree>
     <p:extLst>
       <p:ext uri="{BB962C8B-B14F-4D97-AF65-F5344CB8AC3E}">
-        <p14:creationId xmlns:p14="http://schemas.microsoft.com/office/powerpoint/2010/main" val="702657693"/>
+        <p14:creationId xmlns:p14="http://schemas.microsoft.com/office/powerpoint/2010/main" val="590974281"/>
       </p:ext>
     </p:extLst>
   </p:cSld>
@@ -1995,7 +1995,7 @@
     </p:spTree>
     <p:extLst>
       <p:ext uri="{BB962C8B-B14F-4D97-AF65-F5344CB8AC3E}">
-        <p14:creationId xmlns:p14="http://schemas.microsoft.com/office/powerpoint/2010/main" val="2891194745"/>
+        <p14:creationId xmlns:p14="http://schemas.microsoft.com/office/powerpoint/2010/main" val="702657693"/>
       </p:ext>
     </p:extLst>
   </p:cSld>
@@ -3735,6 +3735,489 @@
           <a:p>
             <a:r>
               <a:rPr lang="en-US" altLang="zh-CN" b="1" dirty="0"/>
+              <a:t>Proposed Approach</a:t>
+            </a:r>
+            <a:endParaRPr lang="zh-CN" altLang="en-US" dirty="0">
+              <a:cs typeface="Segoe UI Light" panose="020B0502040204020203" pitchFamily="34" charset="0"/>
+            </a:endParaRPr>
+          </a:p>
+        </p:txBody>
+      </p:sp>
+      <p:sp>
+        <p:nvSpPr>
+          <p:cNvPr id="38" name="内容占位符 17"/>
+          <p:cNvSpPr txBox="1">
+            <a:spLocks/>
+          </p:cNvSpPr>
+          <p:nvPr/>
+        </p:nvSpPr>
+        <p:spPr>
+          <a:xfrm>
+            <a:off x="406208" y="2000781"/>
+            <a:ext cx="3241278" cy="2903639"/>
+          </a:xfrm>
+          <a:prstGeom prst="rect">
+            <a:avLst/>
+          </a:prstGeom>
+        </p:spPr>
+        <p:txBody>
+          <a:bodyPr vert="horz" lIns="68580" tIns="34290" rIns="68580" bIns="34290" rtlCol="0">
+            <a:normAutofit/>
+          </a:bodyPr>
+          <a:lstStyle>
+            <a:lvl1pPr marL="228600" indent="-228600" algn="l" defTabSz="914400" rtl="0" eaLnBrk="1" latinLnBrk="0" hangingPunct="1">
+              <a:lnSpc>
+                <a:spcPts val="1800"/>
+              </a:lnSpc>
+              <a:spcBef>
+                <a:spcPts val="1000"/>
+              </a:spcBef>
+              <a:spcAft>
+                <a:spcPts val="1000"/>
+              </a:spcAft>
+              <a:buFont typeface="Arial" panose="020B0604020202020204" pitchFamily="34" charset="0"/>
+              <a:buChar char="•"/>
+              <a:defRPr lang="en-US" sz="1200" kern="1200" smtClean="0">
+                <a:solidFill>
+                  <a:schemeClr val="tx1">
+                    <a:lumMod val="75000"/>
+                    <a:lumOff val="25000"/>
+                  </a:schemeClr>
+                </a:solidFill>
+                <a:latin typeface="+mn-lt"/>
+                <a:ea typeface="+mn-ea"/>
+                <a:cs typeface="+mn-cs"/>
+              </a:defRPr>
+            </a:lvl1pPr>
+            <a:lvl2pPr marL="685800" indent="-228600" algn="l" defTabSz="914400" rtl="0" eaLnBrk="1" latinLnBrk="0" hangingPunct="1">
+              <a:lnSpc>
+                <a:spcPts val="1800"/>
+              </a:lnSpc>
+              <a:spcBef>
+                <a:spcPts val="1000"/>
+              </a:spcBef>
+              <a:spcAft>
+                <a:spcPts val="1000"/>
+              </a:spcAft>
+              <a:buFont typeface="Arial" panose="020B0604020202020204" pitchFamily="34" charset="0"/>
+              <a:buChar char="•"/>
+              <a:defRPr lang="en-US" sz="1200" kern="1200" smtClean="0">
+                <a:solidFill>
+                  <a:schemeClr val="tx1">
+                    <a:lumMod val="75000"/>
+                    <a:lumOff val="25000"/>
+                  </a:schemeClr>
+                </a:solidFill>
+                <a:latin typeface="+mn-lt"/>
+                <a:ea typeface="+mn-ea"/>
+                <a:cs typeface="+mn-cs"/>
+              </a:defRPr>
+            </a:lvl2pPr>
+            <a:lvl3pPr marL="1143000" indent="-228600" algn="l" defTabSz="914400" rtl="0" eaLnBrk="1" latinLnBrk="0" hangingPunct="1">
+              <a:lnSpc>
+                <a:spcPts val="1800"/>
+              </a:lnSpc>
+              <a:spcBef>
+                <a:spcPts val="1000"/>
+              </a:spcBef>
+              <a:spcAft>
+                <a:spcPts val="1000"/>
+              </a:spcAft>
+              <a:buFont typeface="Arial" panose="020B0604020202020204" pitchFamily="34" charset="0"/>
+              <a:buChar char="•"/>
+              <a:defRPr lang="en-US" sz="1200" kern="1200" smtClean="0">
+                <a:solidFill>
+                  <a:schemeClr val="tx1">
+                    <a:lumMod val="75000"/>
+                    <a:lumOff val="25000"/>
+                  </a:schemeClr>
+                </a:solidFill>
+                <a:latin typeface="+mn-lt"/>
+                <a:ea typeface="+mn-ea"/>
+                <a:cs typeface="+mn-cs"/>
+              </a:defRPr>
+            </a:lvl3pPr>
+            <a:lvl4pPr marL="1600200" indent="-228600" algn="l" defTabSz="914400" rtl="0" eaLnBrk="1" latinLnBrk="0" hangingPunct="1">
+              <a:lnSpc>
+                <a:spcPts val="1800"/>
+              </a:lnSpc>
+              <a:spcBef>
+                <a:spcPts val="1000"/>
+              </a:spcBef>
+              <a:spcAft>
+                <a:spcPts val="1000"/>
+              </a:spcAft>
+              <a:buFont typeface="Arial" panose="020B0604020202020204" pitchFamily="34" charset="0"/>
+              <a:buChar char="•"/>
+              <a:defRPr lang="en-US" sz="1200" kern="1200" smtClean="0">
+                <a:solidFill>
+                  <a:schemeClr val="tx1">
+                    <a:lumMod val="75000"/>
+                    <a:lumOff val="25000"/>
+                  </a:schemeClr>
+                </a:solidFill>
+                <a:latin typeface="+mn-lt"/>
+                <a:ea typeface="+mn-ea"/>
+                <a:cs typeface="+mn-cs"/>
+              </a:defRPr>
+            </a:lvl4pPr>
+            <a:lvl5pPr marL="2057400" indent="-228600" algn="l" defTabSz="914400" rtl="0" eaLnBrk="1" latinLnBrk="0" hangingPunct="1">
+              <a:lnSpc>
+                <a:spcPts val="1800"/>
+              </a:lnSpc>
+              <a:spcBef>
+                <a:spcPts val="1000"/>
+              </a:spcBef>
+              <a:spcAft>
+                <a:spcPts val="1000"/>
+              </a:spcAft>
+              <a:buFont typeface="Arial" panose="020B0604020202020204" pitchFamily="34" charset="0"/>
+              <a:buChar char="•"/>
+              <a:defRPr lang="en-US" sz="1200" kern="1200">
+                <a:solidFill>
+                  <a:schemeClr val="tx1">
+                    <a:lumMod val="75000"/>
+                    <a:lumOff val="25000"/>
+                  </a:schemeClr>
+                </a:solidFill>
+                <a:latin typeface="+mn-lt"/>
+                <a:ea typeface="+mn-ea"/>
+                <a:cs typeface="+mn-cs"/>
+              </a:defRPr>
+            </a:lvl5pPr>
+            <a:lvl6pPr marL="2514600" indent="-228600" algn="l" defTabSz="914400" rtl="0" eaLnBrk="1" latinLnBrk="0" hangingPunct="1">
+              <a:lnSpc>
+                <a:spcPct val="90000"/>
+              </a:lnSpc>
+              <a:spcBef>
+                <a:spcPct val="30000"/>
+              </a:spcBef>
+              <a:buFont typeface="Arial" panose="020B0604020202020204" pitchFamily="34" charset="0"/>
+              <a:buChar char="•"/>
+              <a:defRPr sz="1800" kern="1200">
+                <a:solidFill>
+                  <a:schemeClr val="tx1"/>
+                </a:solidFill>
+                <a:latin typeface="+mn-lt"/>
+                <a:ea typeface="+mn-ea"/>
+                <a:cs typeface="+mn-cs"/>
+              </a:defRPr>
+            </a:lvl6pPr>
+            <a:lvl7pPr marL="2971800" indent="-228600" algn="l" defTabSz="914400" rtl="0" eaLnBrk="1" latinLnBrk="0" hangingPunct="1">
+              <a:lnSpc>
+                <a:spcPct val="90000"/>
+              </a:lnSpc>
+              <a:spcBef>
+                <a:spcPct val="30000"/>
+              </a:spcBef>
+              <a:buFont typeface="Arial" panose="020B0604020202020204" pitchFamily="34" charset="0"/>
+              <a:buChar char="•"/>
+              <a:defRPr sz="1800" kern="1200">
+                <a:solidFill>
+                  <a:schemeClr val="tx1"/>
+                </a:solidFill>
+                <a:latin typeface="+mn-lt"/>
+                <a:ea typeface="+mn-ea"/>
+                <a:cs typeface="+mn-cs"/>
+              </a:defRPr>
+            </a:lvl7pPr>
+            <a:lvl8pPr marL="3429000" indent="-228600" algn="l" defTabSz="914400" rtl="0" eaLnBrk="1" latinLnBrk="0" hangingPunct="1">
+              <a:lnSpc>
+                <a:spcPct val="90000"/>
+              </a:lnSpc>
+              <a:spcBef>
+                <a:spcPct val="30000"/>
+              </a:spcBef>
+              <a:buFont typeface="Arial" panose="020B0604020202020204" pitchFamily="34" charset="0"/>
+              <a:buChar char="•"/>
+              <a:defRPr sz="1800" kern="1200">
+                <a:solidFill>
+                  <a:schemeClr val="tx1"/>
+                </a:solidFill>
+                <a:latin typeface="+mn-lt"/>
+                <a:ea typeface="+mn-ea"/>
+                <a:cs typeface="+mn-cs"/>
+              </a:defRPr>
+            </a:lvl8pPr>
+            <a:lvl9pPr marL="3886200" indent="-228600" algn="l" defTabSz="914400" rtl="0" eaLnBrk="1" latinLnBrk="0" hangingPunct="1">
+              <a:lnSpc>
+                <a:spcPct val="90000"/>
+              </a:lnSpc>
+              <a:spcBef>
+                <a:spcPct val="30000"/>
+              </a:spcBef>
+              <a:buFont typeface="Arial" panose="020B0604020202020204" pitchFamily="34" charset="0"/>
+              <a:buChar char="•"/>
+              <a:defRPr sz="1800" kern="1200">
+                <a:solidFill>
+                  <a:schemeClr val="tx1"/>
+                </a:solidFill>
+                <a:latin typeface="+mn-lt"/>
+                <a:ea typeface="+mn-ea"/>
+                <a:cs typeface="+mn-cs"/>
+              </a:defRPr>
+            </a:lvl9pPr>
+          </a:lstStyle>
+          <a:p>
+            <a:pPr marL="0" indent="0">
+              <a:spcAft>
+                <a:spcPts val="450"/>
+              </a:spcAft>
+              <a:buNone/>
+              <a:defRPr/>
+            </a:pPr>
+            <a:endParaRPr lang="zh-CN" altLang="en-US" sz="900" dirty="0">
+              <a:latin typeface="Microsoft YaHei UI" panose="020B0503020204020204" pitchFamily="34" charset="-122"/>
+              <a:ea typeface="Microsoft YaHei UI" panose="020B0503020204020204" pitchFamily="34" charset="-122"/>
+              <a:cs typeface="Segoe UI" panose="020B0502040204020203" pitchFamily="34" charset="0"/>
+            </a:endParaRPr>
+          </a:p>
+        </p:txBody>
+      </p:sp>
+      <p:sp>
+        <p:nvSpPr>
+          <p:cNvPr id="2" name="矩形 1">
+            <a:extLst>
+              <a:ext uri="{FF2B5EF4-FFF2-40B4-BE49-F238E27FC236}">
+                <a16:creationId xmlns:a16="http://schemas.microsoft.com/office/drawing/2014/main" id="{61913634-122C-430D-BE79-95FE908A90D7}"/>
+              </a:ext>
+            </a:extLst>
+          </p:cNvPr>
+          <p:cNvSpPr/>
+          <p:nvPr/>
+        </p:nvSpPr>
+        <p:spPr>
+          <a:xfrm>
+            <a:off x="351020" y="1367235"/>
+            <a:ext cx="8386771" cy="4189993"/>
+          </a:xfrm>
+          <a:prstGeom prst="rect">
+            <a:avLst/>
+          </a:prstGeom>
+        </p:spPr>
+        <p:txBody>
+          <a:bodyPr wrap="square">
+            <a:spAutoFit/>
+          </a:bodyPr>
+          <a:lstStyle/>
+          <a:p>
+            <a:pPr marL="342900" indent="-342900">
+              <a:lnSpc>
+                <a:spcPct val="150000"/>
+              </a:lnSpc>
+              <a:buClr>
+                <a:srgbClr val="0070C0"/>
+              </a:buClr>
+              <a:buFont typeface="Arial" panose="020B0604020202020204" pitchFamily="34" charset="0"/>
+              <a:buChar char="•"/>
+            </a:pPr>
+            <a:r>
+              <a:rPr lang="en-US" altLang="zh-CN" sz="2000" b="1" dirty="0">
+                <a:latin typeface="Segoe UI (Textkörper)"/>
+              </a:rPr>
+              <a:t>Data processing:</a:t>
+            </a:r>
+          </a:p>
+          <a:p>
+            <a:pPr marL="800100" lvl="1" indent="-342900">
+              <a:lnSpc>
+                <a:spcPct val="150000"/>
+              </a:lnSpc>
+              <a:buClr>
+                <a:srgbClr val="0070C0"/>
+              </a:buClr>
+              <a:buFont typeface="Arial" panose="020B0604020202020204" pitchFamily="34" charset="0"/>
+              <a:buChar char="•"/>
+            </a:pPr>
+            <a:r>
+              <a:rPr lang="en-US" altLang="zh-CN" sz="2000" dirty="0">
+                <a:latin typeface="Segoe UI (Textkörper)"/>
+              </a:rPr>
+              <a:t>Load the data (images with annotations)</a:t>
+            </a:r>
+          </a:p>
+          <a:p>
+            <a:pPr marL="800100" lvl="1" indent="-342900">
+              <a:lnSpc>
+                <a:spcPct val="150000"/>
+              </a:lnSpc>
+              <a:buClr>
+                <a:srgbClr val="0070C0"/>
+              </a:buClr>
+              <a:buFont typeface="Arial" panose="020B0604020202020204" pitchFamily="34" charset="0"/>
+              <a:buChar char="•"/>
+            </a:pPr>
+            <a:r>
+              <a:rPr lang="en-US" altLang="zh-CN" sz="2000" dirty="0">
+                <a:latin typeface="Segoe UI (Textkörper)"/>
+              </a:rPr>
+              <a:t>Augment the data:</a:t>
+            </a:r>
+          </a:p>
+          <a:p>
+            <a:pPr marL="1257300" lvl="2" indent="-342900">
+              <a:lnSpc>
+                <a:spcPct val="150000"/>
+              </a:lnSpc>
+              <a:buClr>
+                <a:srgbClr val="0070C0"/>
+              </a:buClr>
+              <a:buFont typeface="Arial" panose="020B0604020202020204" pitchFamily="34" charset="0"/>
+              <a:buChar char="•"/>
+            </a:pPr>
+            <a:r>
+              <a:rPr lang="en-US" altLang="zh-CN" sz="2000" dirty="0">
+                <a:latin typeface="Segoe UI (Textkörper)"/>
+              </a:rPr>
+              <a:t>Uniform size of 299x299 resolution</a:t>
+            </a:r>
+          </a:p>
+          <a:p>
+            <a:pPr marL="1257300" lvl="2" indent="-342900">
+              <a:lnSpc>
+                <a:spcPct val="150000"/>
+              </a:lnSpc>
+              <a:buClr>
+                <a:srgbClr val="0070C0"/>
+              </a:buClr>
+              <a:buFont typeface="Arial" panose="020B0604020202020204" pitchFamily="34" charset="0"/>
+              <a:buChar char="•"/>
+            </a:pPr>
+            <a:r>
+              <a:rPr lang="en-US" altLang="zh-CN" sz="2000" dirty="0">
+                <a:latin typeface="Segoe UI (Textkörper)"/>
+              </a:rPr>
+              <a:t>For color: brightness, contrast, saturation, hue modifications</a:t>
+            </a:r>
+          </a:p>
+          <a:p>
+            <a:pPr marL="1257300" lvl="2" indent="-342900">
+              <a:lnSpc>
+                <a:spcPct val="150000"/>
+              </a:lnSpc>
+              <a:buClr>
+                <a:srgbClr val="0070C0"/>
+              </a:buClr>
+              <a:buFont typeface="Arial" panose="020B0604020202020204" pitchFamily="34" charset="0"/>
+              <a:buChar char="•"/>
+            </a:pPr>
+            <a:r>
+              <a:rPr lang="en-US" altLang="zh-CN" sz="2000" dirty="0">
+                <a:latin typeface="Segoe UI (Textkörper)"/>
+              </a:rPr>
+              <a:t>For image: Scaling, flipping, center crop</a:t>
+            </a:r>
+          </a:p>
+          <a:p>
+            <a:pPr marL="1257300" lvl="2" indent="-342900">
+              <a:lnSpc>
+                <a:spcPct val="150000"/>
+              </a:lnSpc>
+              <a:buClr>
+                <a:srgbClr val="0070C0"/>
+              </a:buClr>
+              <a:buFont typeface="Arial" panose="020B0604020202020204" pitchFamily="34" charset="0"/>
+              <a:buChar char="•"/>
+            </a:pPr>
+            <a:endParaRPr lang="en-US" altLang="zh-CN" sz="2000" dirty="0">
+              <a:latin typeface="Segoe UI (Textkörper)"/>
+            </a:endParaRPr>
+          </a:p>
+          <a:p>
+            <a:pPr marL="342900" indent="-342900">
+              <a:lnSpc>
+                <a:spcPct val="150000"/>
+              </a:lnSpc>
+              <a:buClr>
+                <a:srgbClr val="0070C0"/>
+              </a:buClr>
+              <a:buFont typeface="Arial" panose="020B0604020202020204" pitchFamily="34" charset="0"/>
+              <a:buChar char="•"/>
+            </a:pPr>
+            <a:r>
+              <a:rPr lang="en-US" altLang="zh-CN" sz="2000" b="1" dirty="0">
+                <a:latin typeface="Segoe UI (Textkörper)"/>
+              </a:rPr>
+              <a:t>Training:</a:t>
+            </a:r>
+          </a:p>
+          <a:p>
+            <a:pPr marL="800100" lvl="1" indent="-342900">
+              <a:lnSpc>
+                <a:spcPct val="150000"/>
+              </a:lnSpc>
+              <a:buClr>
+                <a:srgbClr val="0070C0"/>
+              </a:buClr>
+              <a:buFont typeface="Arial" panose="020B0604020202020204" pitchFamily="34" charset="0"/>
+              <a:buChar char="•"/>
+            </a:pPr>
+            <a:r>
+              <a:rPr lang="en-US" altLang="zh-CN" sz="2000" dirty="0">
+                <a:latin typeface="Segoe UI (Textkörper)"/>
+              </a:rPr>
+              <a:t>Tune hyperparameters, epochs and batch sizes</a:t>
+            </a:r>
+          </a:p>
+        </p:txBody>
+      </p:sp>
+    </p:spTree>
+    <p:extLst>
+      <p:ext uri="{BB962C8B-B14F-4D97-AF65-F5344CB8AC3E}">
+        <p14:creationId xmlns:p14="http://schemas.microsoft.com/office/powerpoint/2010/main" val="2095750614"/>
+      </p:ext>
+    </p:extLst>
+  </p:cSld>
+  <p:clrMapOvr>
+    <a:masterClrMapping/>
+  </p:clrMapOvr>
+  <mc:AlternateContent xmlns:mc="http://schemas.openxmlformats.org/markup-compatibility/2006" xmlns:p14="http://schemas.microsoft.com/office/powerpoint/2010/main">
+    <mc:Choice Requires="p14">
+      <p:transition p14:dur="10"/>
+    </mc:Choice>
+    <mc:Fallback xmlns="">
+      <p:transition/>
+    </mc:Fallback>
+  </mc:AlternateContent>
+</p:sld>
+</file>
+
+<file path=ppt/slides/slide11.xml><?xml version="1.0" encoding="utf-8"?>
+<p:sld xmlns:a="http://schemas.openxmlformats.org/drawingml/2006/main" xmlns:r="http://schemas.openxmlformats.org/officeDocument/2006/relationships" xmlns:p="http://schemas.openxmlformats.org/presentationml/2006/main">
+  <p:cSld>
+    <p:spTree>
+      <p:nvGrpSpPr>
+        <p:cNvPr id="1" name=""/>
+        <p:cNvGrpSpPr/>
+        <p:nvPr/>
+      </p:nvGrpSpPr>
+      <p:grpSpPr>
+        <a:xfrm>
+          <a:off x="0" y="0"/>
+          <a:ext cx="0" cy="0"/>
+          <a:chOff x="0" y="0"/>
+          <a:chExt cx="0" cy="0"/>
+        </a:xfrm>
+      </p:grpSpPr>
+      <p:sp>
+        <p:nvSpPr>
+          <p:cNvPr id="8" name="标题 7"/>
+          <p:cNvSpPr>
+            <a:spLocks noGrp="1"/>
+          </p:cNvSpPr>
+          <p:nvPr>
+            <p:ph type="title"/>
+          </p:nvPr>
+        </p:nvSpPr>
+        <p:spPr/>
+        <p:txBody>
+          <a:bodyPr rtlCol="0">
+            <a:noAutofit/>
+          </a:bodyPr>
+          <a:lstStyle/>
+          <a:p>
+            <a:r>
+              <a:rPr lang="en-US" altLang="zh-CN" b="1" dirty="0"/>
               <a:t>Experiment Results</a:t>
             </a:r>
             <a:endParaRPr lang="zh-CN" altLang="en-US" dirty="0">
@@ -4411,460 +4894,6 @@
     <p:extLst>
       <p:ext uri="{BB962C8B-B14F-4D97-AF65-F5344CB8AC3E}">
         <p14:creationId xmlns:p14="http://schemas.microsoft.com/office/powerpoint/2010/main" val="1771165611"/>
-      </p:ext>
-    </p:extLst>
-  </p:cSld>
-  <p:clrMapOvr>
-    <a:masterClrMapping/>
-  </p:clrMapOvr>
-  <mc:AlternateContent xmlns:mc="http://schemas.openxmlformats.org/markup-compatibility/2006" xmlns:p14="http://schemas.microsoft.com/office/powerpoint/2010/main">
-    <mc:Choice Requires="p14">
-      <p:transition p14:dur="10"/>
-    </mc:Choice>
-    <mc:Fallback xmlns="">
-      <p:transition/>
-    </mc:Fallback>
-  </mc:AlternateContent>
-</p:sld>
-</file>
-
-<file path=ppt/slides/slide11.xml><?xml version="1.0" encoding="utf-8"?>
-<p:sld xmlns:a="http://schemas.openxmlformats.org/drawingml/2006/main" xmlns:r="http://schemas.openxmlformats.org/officeDocument/2006/relationships" xmlns:p="http://schemas.openxmlformats.org/presentationml/2006/main">
-  <p:cSld>
-    <p:spTree>
-      <p:nvGrpSpPr>
-        <p:cNvPr id="1" name=""/>
-        <p:cNvGrpSpPr/>
-        <p:nvPr/>
-      </p:nvGrpSpPr>
-      <p:grpSpPr>
-        <a:xfrm>
-          <a:off x="0" y="0"/>
-          <a:ext cx="0" cy="0"/>
-          <a:chOff x="0" y="0"/>
-          <a:chExt cx="0" cy="0"/>
-        </a:xfrm>
-      </p:grpSpPr>
-      <p:sp>
-        <p:nvSpPr>
-          <p:cNvPr id="8" name="标题 7"/>
-          <p:cNvSpPr>
-            <a:spLocks noGrp="1"/>
-          </p:cNvSpPr>
-          <p:nvPr>
-            <p:ph type="title"/>
-          </p:nvPr>
-        </p:nvSpPr>
-        <p:spPr/>
-        <p:txBody>
-          <a:bodyPr rtlCol="0">
-            <a:noAutofit/>
-          </a:bodyPr>
-          <a:lstStyle/>
-          <a:p>
-            <a:r>
-              <a:rPr lang="en-US" altLang="zh-CN" b="1" dirty="0"/>
-              <a:t>Conclusions</a:t>
-            </a:r>
-            <a:endParaRPr lang="zh-CN" altLang="en-US" dirty="0">
-              <a:cs typeface="Segoe UI Light" panose="020B0502040204020203" pitchFamily="34" charset="0"/>
-            </a:endParaRPr>
-          </a:p>
-        </p:txBody>
-      </p:sp>
-      <p:sp>
-        <p:nvSpPr>
-          <p:cNvPr id="38" name="内容占位符 17"/>
-          <p:cNvSpPr txBox="1">
-            <a:spLocks/>
-          </p:cNvSpPr>
-          <p:nvPr/>
-        </p:nvSpPr>
-        <p:spPr>
-          <a:xfrm>
-            <a:off x="406208" y="2000781"/>
-            <a:ext cx="3241278" cy="2903639"/>
-          </a:xfrm>
-          <a:prstGeom prst="rect">
-            <a:avLst/>
-          </a:prstGeom>
-        </p:spPr>
-        <p:txBody>
-          <a:bodyPr vert="horz" lIns="68580" tIns="34290" rIns="68580" bIns="34290" rtlCol="0">
-            <a:normAutofit/>
-          </a:bodyPr>
-          <a:lstStyle>
-            <a:lvl1pPr marL="228600" indent="-228600" algn="l" defTabSz="914400" rtl="0" eaLnBrk="1" latinLnBrk="0" hangingPunct="1">
-              <a:lnSpc>
-                <a:spcPts val="1800"/>
-              </a:lnSpc>
-              <a:spcBef>
-                <a:spcPts val="1000"/>
-              </a:spcBef>
-              <a:spcAft>
-                <a:spcPts val="1000"/>
-              </a:spcAft>
-              <a:buFont typeface="Arial" panose="020B0604020202020204" pitchFamily="34" charset="0"/>
-              <a:buChar char="•"/>
-              <a:defRPr lang="en-US" sz="1200" kern="1200" smtClean="0">
-                <a:solidFill>
-                  <a:schemeClr val="tx1">
-                    <a:lumMod val="75000"/>
-                    <a:lumOff val="25000"/>
-                  </a:schemeClr>
-                </a:solidFill>
-                <a:latin typeface="+mn-lt"/>
-                <a:ea typeface="+mn-ea"/>
-                <a:cs typeface="+mn-cs"/>
-              </a:defRPr>
-            </a:lvl1pPr>
-            <a:lvl2pPr marL="685800" indent="-228600" algn="l" defTabSz="914400" rtl="0" eaLnBrk="1" latinLnBrk="0" hangingPunct="1">
-              <a:lnSpc>
-                <a:spcPts val="1800"/>
-              </a:lnSpc>
-              <a:spcBef>
-                <a:spcPts val="1000"/>
-              </a:spcBef>
-              <a:spcAft>
-                <a:spcPts val="1000"/>
-              </a:spcAft>
-              <a:buFont typeface="Arial" panose="020B0604020202020204" pitchFamily="34" charset="0"/>
-              <a:buChar char="•"/>
-              <a:defRPr lang="en-US" sz="1200" kern="1200" smtClean="0">
-                <a:solidFill>
-                  <a:schemeClr val="tx1">
-                    <a:lumMod val="75000"/>
-                    <a:lumOff val="25000"/>
-                  </a:schemeClr>
-                </a:solidFill>
-                <a:latin typeface="+mn-lt"/>
-                <a:ea typeface="+mn-ea"/>
-                <a:cs typeface="+mn-cs"/>
-              </a:defRPr>
-            </a:lvl2pPr>
-            <a:lvl3pPr marL="1143000" indent="-228600" algn="l" defTabSz="914400" rtl="0" eaLnBrk="1" latinLnBrk="0" hangingPunct="1">
-              <a:lnSpc>
-                <a:spcPts val="1800"/>
-              </a:lnSpc>
-              <a:spcBef>
-                <a:spcPts val="1000"/>
-              </a:spcBef>
-              <a:spcAft>
-                <a:spcPts val="1000"/>
-              </a:spcAft>
-              <a:buFont typeface="Arial" panose="020B0604020202020204" pitchFamily="34" charset="0"/>
-              <a:buChar char="•"/>
-              <a:defRPr lang="en-US" sz="1200" kern="1200" smtClean="0">
-                <a:solidFill>
-                  <a:schemeClr val="tx1">
-                    <a:lumMod val="75000"/>
-                    <a:lumOff val="25000"/>
-                  </a:schemeClr>
-                </a:solidFill>
-                <a:latin typeface="+mn-lt"/>
-                <a:ea typeface="+mn-ea"/>
-                <a:cs typeface="+mn-cs"/>
-              </a:defRPr>
-            </a:lvl3pPr>
-            <a:lvl4pPr marL="1600200" indent="-228600" algn="l" defTabSz="914400" rtl="0" eaLnBrk="1" latinLnBrk="0" hangingPunct="1">
-              <a:lnSpc>
-                <a:spcPts val="1800"/>
-              </a:lnSpc>
-              <a:spcBef>
-                <a:spcPts val="1000"/>
-              </a:spcBef>
-              <a:spcAft>
-                <a:spcPts val="1000"/>
-              </a:spcAft>
-              <a:buFont typeface="Arial" panose="020B0604020202020204" pitchFamily="34" charset="0"/>
-              <a:buChar char="•"/>
-              <a:defRPr lang="en-US" sz="1200" kern="1200" smtClean="0">
-                <a:solidFill>
-                  <a:schemeClr val="tx1">
-                    <a:lumMod val="75000"/>
-                    <a:lumOff val="25000"/>
-                  </a:schemeClr>
-                </a:solidFill>
-                <a:latin typeface="+mn-lt"/>
-                <a:ea typeface="+mn-ea"/>
-                <a:cs typeface="+mn-cs"/>
-              </a:defRPr>
-            </a:lvl4pPr>
-            <a:lvl5pPr marL="2057400" indent="-228600" algn="l" defTabSz="914400" rtl="0" eaLnBrk="1" latinLnBrk="0" hangingPunct="1">
-              <a:lnSpc>
-                <a:spcPts val="1800"/>
-              </a:lnSpc>
-              <a:spcBef>
-                <a:spcPts val="1000"/>
-              </a:spcBef>
-              <a:spcAft>
-                <a:spcPts val="1000"/>
-              </a:spcAft>
-              <a:buFont typeface="Arial" panose="020B0604020202020204" pitchFamily="34" charset="0"/>
-              <a:buChar char="•"/>
-              <a:defRPr lang="en-US" sz="1200" kern="1200">
-                <a:solidFill>
-                  <a:schemeClr val="tx1">
-                    <a:lumMod val="75000"/>
-                    <a:lumOff val="25000"/>
-                  </a:schemeClr>
-                </a:solidFill>
-                <a:latin typeface="+mn-lt"/>
-                <a:ea typeface="+mn-ea"/>
-                <a:cs typeface="+mn-cs"/>
-              </a:defRPr>
-            </a:lvl5pPr>
-            <a:lvl6pPr marL="2514600" indent="-228600" algn="l" defTabSz="914400" rtl="0" eaLnBrk="1" latinLnBrk="0" hangingPunct="1">
-              <a:lnSpc>
-                <a:spcPct val="90000"/>
-              </a:lnSpc>
-              <a:spcBef>
-                <a:spcPct val="30000"/>
-              </a:spcBef>
-              <a:buFont typeface="Arial" panose="020B0604020202020204" pitchFamily="34" charset="0"/>
-              <a:buChar char="•"/>
-              <a:defRPr sz="1800" kern="1200">
-                <a:solidFill>
-                  <a:schemeClr val="tx1"/>
-                </a:solidFill>
-                <a:latin typeface="+mn-lt"/>
-                <a:ea typeface="+mn-ea"/>
-                <a:cs typeface="+mn-cs"/>
-              </a:defRPr>
-            </a:lvl6pPr>
-            <a:lvl7pPr marL="2971800" indent="-228600" algn="l" defTabSz="914400" rtl="0" eaLnBrk="1" latinLnBrk="0" hangingPunct="1">
-              <a:lnSpc>
-                <a:spcPct val="90000"/>
-              </a:lnSpc>
-              <a:spcBef>
-                <a:spcPct val="30000"/>
-              </a:spcBef>
-              <a:buFont typeface="Arial" panose="020B0604020202020204" pitchFamily="34" charset="0"/>
-              <a:buChar char="•"/>
-              <a:defRPr sz="1800" kern="1200">
-                <a:solidFill>
-                  <a:schemeClr val="tx1"/>
-                </a:solidFill>
-                <a:latin typeface="+mn-lt"/>
-                <a:ea typeface="+mn-ea"/>
-                <a:cs typeface="+mn-cs"/>
-              </a:defRPr>
-            </a:lvl7pPr>
-            <a:lvl8pPr marL="3429000" indent="-228600" algn="l" defTabSz="914400" rtl="0" eaLnBrk="1" latinLnBrk="0" hangingPunct="1">
-              <a:lnSpc>
-                <a:spcPct val="90000"/>
-              </a:lnSpc>
-              <a:spcBef>
-                <a:spcPct val="30000"/>
-              </a:spcBef>
-              <a:buFont typeface="Arial" panose="020B0604020202020204" pitchFamily="34" charset="0"/>
-              <a:buChar char="•"/>
-              <a:defRPr sz="1800" kern="1200">
-                <a:solidFill>
-                  <a:schemeClr val="tx1"/>
-                </a:solidFill>
-                <a:latin typeface="+mn-lt"/>
-                <a:ea typeface="+mn-ea"/>
-                <a:cs typeface="+mn-cs"/>
-              </a:defRPr>
-            </a:lvl8pPr>
-            <a:lvl9pPr marL="3886200" indent="-228600" algn="l" defTabSz="914400" rtl="0" eaLnBrk="1" latinLnBrk="0" hangingPunct="1">
-              <a:lnSpc>
-                <a:spcPct val="90000"/>
-              </a:lnSpc>
-              <a:spcBef>
-                <a:spcPct val="30000"/>
-              </a:spcBef>
-              <a:buFont typeface="Arial" panose="020B0604020202020204" pitchFamily="34" charset="0"/>
-              <a:buChar char="•"/>
-              <a:defRPr sz="1800" kern="1200">
-                <a:solidFill>
-                  <a:schemeClr val="tx1"/>
-                </a:solidFill>
-                <a:latin typeface="+mn-lt"/>
-                <a:ea typeface="+mn-ea"/>
-                <a:cs typeface="+mn-cs"/>
-              </a:defRPr>
-            </a:lvl9pPr>
-          </a:lstStyle>
-          <a:p>
-            <a:pPr marL="0" indent="0">
-              <a:spcAft>
-                <a:spcPts val="450"/>
-              </a:spcAft>
-              <a:buNone/>
-              <a:defRPr/>
-            </a:pPr>
-            <a:endParaRPr lang="zh-CN" altLang="en-US" sz="900" dirty="0">
-              <a:latin typeface="Microsoft YaHei UI" panose="020B0503020204020204" pitchFamily="34" charset="-122"/>
-              <a:ea typeface="Microsoft YaHei UI" panose="020B0503020204020204" pitchFamily="34" charset="-122"/>
-              <a:cs typeface="Segoe UI" panose="020B0502040204020203" pitchFamily="34" charset="0"/>
-            </a:endParaRPr>
-          </a:p>
-        </p:txBody>
-      </p:sp>
-      <p:sp>
-        <p:nvSpPr>
-          <p:cNvPr id="2" name="矩形 1">
-            <a:extLst>
-              <a:ext uri="{FF2B5EF4-FFF2-40B4-BE49-F238E27FC236}">
-                <a16:creationId xmlns:a16="http://schemas.microsoft.com/office/drawing/2014/main" id="{61913634-122C-430D-BE79-95FE908A90D7}"/>
-              </a:ext>
-            </a:extLst>
-          </p:cNvPr>
-          <p:cNvSpPr/>
-          <p:nvPr/>
-        </p:nvSpPr>
-        <p:spPr>
-          <a:xfrm>
-            <a:off x="351020" y="1367235"/>
-            <a:ext cx="8386771" cy="4189993"/>
-          </a:xfrm>
-          <a:prstGeom prst="rect">
-            <a:avLst/>
-          </a:prstGeom>
-        </p:spPr>
-        <p:txBody>
-          <a:bodyPr wrap="square">
-            <a:spAutoFit/>
-          </a:bodyPr>
-          <a:lstStyle/>
-          <a:p>
-            <a:pPr marL="342900" indent="-342900">
-              <a:lnSpc>
-                <a:spcPct val="150000"/>
-              </a:lnSpc>
-              <a:buClr>
-                <a:srgbClr val="0070C0"/>
-              </a:buClr>
-              <a:buFont typeface="Arial" panose="020B0604020202020204" pitchFamily="34" charset="0"/>
-              <a:buChar char="•"/>
-            </a:pPr>
-            <a:r>
-              <a:rPr lang="en-US" altLang="zh-CN" sz="2000" b="1" dirty="0">
-                <a:latin typeface="Segoe UI (Textkörper)"/>
-              </a:rPr>
-              <a:t>Challenges:</a:t>
-            </a:r>
-          </a:p>
-          <a:p>
-            <a:pPr marL="800100" lvl="1" indent="-342900">
-              <a:lnSpc>
-                <a:spcPct val="150000"/>
-              </a:lnSpc>
-              <a:buClr>
-                <a:srgbClr val="0070C0"/>
-              </a:buClr>
-              <a:buFont typeface="Arial" panose="020B0604020202020204" pitchFamily="34" charset="0"/>
-              <a:buChar char="•"/>
-            </a:pPr>
-            <a:r>
-              <a:rPr lang="en-US" altLang="zh-CN" sz="2000" dirty="0">
-                <a:latin typeface="Segoe UI (Textkörper)"/>
-              </a:rPr>
-              <a:t>Storage issues:</a:t>
-            </a:r>
-          </a:p>
-          <a:p>
-            <a:pPr marL="1257300" lvl="2" indent="-342900">
-              <a:lnSpc>
-                <a:spcPct val="150000"/>
-              </a:lnSpc>
-              <a:buClr>
-                <a:srgbClr val="0070C0"/>
-              </a:buClr>
-              <a:buFont typeface="Arial" panose="020B0604020202020204" pitchFamily="34" charset="0"/>
-              <a:buChar char="•"/>
-            </a:pPr>
-            <a:r>
-              <a:rPr lang="en-US" altLang="zh-CN" sz="2000" dirty="0">
-                <a:latin typeface="Segoe UI (Textkörper)"/>
-              </a:rPr>
-              <a:t>Over 85gb in .zip format was too much for Kaggle / Google </a:t>
-            </a:r>
-            <a:r>
-              <a:rPr lang="en-US" altLang="zh-CN" sz="2000" dirty="0" err="1">
-                <a:latin typeface="Segoe UI (Textkörper)"/>
-              </a:rPr>
-              <a:t>Colab</a:t>
-            </a:r>
-            <a:endParaRPr lang="en-US" altLang="zh-CN" sz="2000" dirty="0">
-              <a:latin typeface="Segoe UI (Textkörper)"/>
-            </a:endParaRPr>
-          </a:p>
-          <a:p>
-            <a:pPr marL="800100" lvl="1" indent="-342900">
-              <a:lnSpc>
-                <a:spcPct val="150000"/>
-              </a:lnSpc>
-              <a:buClr>
-                <a:srgbClr val="0070C0"/>
-              </a:buClr>
-              <a:buFont typeface="Arial" panose="020B0604020202020204" pitchFamily="34" charset="0"/>
-              <a:buChar char="•"/>
-            </a:pPr>
-            <a:r>
-              <a:rPr lang="en-US" altLang="zh-CN" sz="2000" dirty="0">
-                <a:latin typeface="Segoe UI (Textkörper)"/>
-              </a:rPr>
-              <a:t>Memory issues:</a:t>
-            </a:r>
-          </a:p>
-          <a:p>
-            <a:pPr marL="1257300" lvl="2" indent="-342900">
-              <a:lnSpc>
-                <a:spcPct val="150000"/>
-              </a:lnSpc>
-              <a:buClr>
-                <a:srgbClr val="0070C0"/>
-              </a:buClr>
-              <a:buFont typeface="Arial" panose="020B0604020202020204" pitchFamily="34" charset="0"/>
-              <a:buChar char="•"/>
-            </a:pPr>
-            <a:r>
-              <a:rPr lang="en-US" altLang="zh-CN" sz="2000" dirty="0">
-                <a:latin typeface="Segoe UI (Textkörper)"/>
-              </a:rPr>
-              <a:t>Own computer had insufficient memory, e.g. 4GB ram</a:t>
-            </a:r>
-          </a:p>
-          <a:p>
-            <a:pPr marL="342900" indent="-342900">
-              <a:lnSpc>
-                <a:spcPct val="150000"/>
-              </a:lnSpc>
-              <a:buClr>
-                <a:srgbClr val="0070C0"/>
-              </a:buClr>
-              <a:buFont typeface="Arial" panose="020B0604020202020204" pitchFamily="34" charset="0"/>
-              <a:buChar char="•"/>
-            </a:pPr>
-            <a:r>
-              <a:rPr lang="en-US" altLang="zh-CN" sz="2000" dirty="0">
-                <a:latin typeface="Segoe UI (Textkörper)"/>
-              </a:rPr>
-              <a:t>As a solution the computation was executed in the lab</a:t>
-            </a:r>
-            <a:br>
-              <a:rPr lang="en-US" altLang="zh-CN" sz="2000" dirty="0">
-                <a:latin typeface="Segoe UI (Textkörper)"/>
-              </a:rPr>
-            </a:br>
-            <a:br>
-              <a:rPr lang="en-US" altLang="zh-CN" sz="2000" dirty="0">
-                <a:latin typeface="Segoe UI (Textkörper)"/>
-              </a:rPr>
-            </a:br>
-            <a:endParaRPr lang="zh-CN" altLang="en-US" sz="2000" dirty="0">
-              <a:latin typeface="Segoe UI (Textkörper)"/>
-            </a:endParaRPr>
-          </a:p>
-        </p:txBody>
-      </p:sp>
-    </p:spTree>
-    <p:extLst>
-      <p:ext uri="{BB962C8B-B14F-4D97-AF65-F5344CB8AC3E}">
-        <p14:creationId xmlns:p14="http://schemas.microsoft.com/office/powerpoint/2010/main" val="3579581167"/>
       </p:ext>
     </p:extLst>
   </p:cSld>
@@ -8586,6 +8615,475 @@
           <a:p>
             <a:r>
               <a:rPr lang="en-US" altLang="zh-CN" b="1" dirty="0"/>
+              <a:t>Introduction</a:t>
+            </a:r>
+            <a:endParaRPr lang="zh-CN" altLang="en-US" dirty="0">
+              <a:cs typeface="Segoe UI Light" panose="020B0502040204020203" pitchFamily="34" charset="0"/>
+            </a:endParaRPr>
+          </a:p>
+        </p:txBody>
+      </p:sp>
+      <p:sp>
+        <p:nvSpPr>
+          <p:cNvPr id="38" name="内容占位符 17"/>
+          <p:cNvSpPr txBox="1">
+            <a:spLocks/>
+          </p:cNvSpPr>
+          <p:nvPr/>
+        </p:nvSpPr>
+        <p:spPr>
+          <a:xfrm>
+            <a:off x="406208" y="2000781"/>
+            <a:ext cx="3241278" cy="2903639"/>
+          </a:xfrm>
+          <a:prstGeom prst="rect">
+            <a:avLst/>
+          </a:prstGeom>
+        </p:spPr>
+        <p:txBody>
+          <a:bodyPr vert="horz" lIns="68580" tIns="34290" rIns="68580" bIns="34290" rtlCol="0">
+            <a:normAutofit/>
+          </a:bodyPr>
+          <a:lstStyle>
+            <a:lvl1pPr marL="228600" indent="-228600" algn="l" defTabSz="914400" rtl="0" eaLnBrk="1" latinLnBrk="0" hangingPunct="1">
+              <a:lnSpc>
+                <a:spcPts val="1800"/>
+              </a:lnSpc>
+              <a:spcBef>
+                <a:spcPts val="1000"/>
+              </a:spcBef>
+              <a:spcAft>
+                <a:spcPts val="1000"/>
+              </a:spcAft>
+              <a:buFont typeface="Arial" panose="020B0604020202020204" pitchFamily="34" charset="0"/>
+              <a:buChar char="•"/>
+              <a:defRPr lang="en-US" sz="1200" kern="1200" smtClean="0">
+                <a:solidFill>
+                  <a:schemeClr val="tx1">
+                    <a:lumMod val="75000"/>
+                    <a:lumOff val="25000"/>
+                  </a:schemeClr>
+                </a:solidFill>
+                <a:latin typeface="+mn-lt"/>
+                <a:ea typeface="+mn-ea"/>
+                <a:cs typeface="+mn-cs"/>
+              </a:defRPr>
+            </a:lvl1pPr>
+            <a:lvl2pPr marL="685800" indent="-228600" algn="l" defTabSz="914400" rtl="0" eaLnBrk="1" latinLnBrk="0" hangingPunct="1">
+              <a:lnSpc>
+                <a:spcPts val="1800"/>
+              </a:lnSpc>
+              <a:spcBef>
+                <a:spcPts val="1000"/>
+              </a:spcBef>
+              <a:spcAft>
+                <a:spcPts val="1000"/>
+              </a:spcAft>
+              <a:buFont typeface="Arial" panose="020B0604020202020204" pitchFamily="34" charset="0"/>
+              <a:buChar char="•"/>
+              <a:defRPr lang="en-US" sz="1200" kern="1200" smtClean="0">
+                <a:solidFill>
+                  <a:schemeClr val="tx1">
+                    <a:lumMod val="75000"/>
+                    <a:lumOff val="25000"/>
+                  </a:schemeClr>
+                </a:solidFill>
+                <a:latin typeface="+mn-lt"/>
+                <a:ea typeface="+mn-ea"/>
+                <a:cs typeface="+mn-cs"/>
+              </a:defRPr>
+            </a:lvl2pPr>
+            <a:lvl3pPr marL="1143000" indent="-228600" algn="l" defTabSz="914400" rtl="0" eaLnBrk="1" latinLnBrk="0" hangingPunct="1">
+              <a:lnSpc>
+                <a:spcPts val="1800"/>
+              </a:lnSpc>
+              <a:spcBef>
+                <a:spcPts val="1000"/>
+              </a:spcBef>
+              <a:spcAft>
+                <a:spcPts val="1000"/>
+              </a:spcAft>
+              <a:buFont typeface="Arial" panose="020B0604020202020204" pitchFamily="34" charset="0"/>
+              <a:buChar char="•"/>
+              <a:defRPr lang="en-US" sz="1200" kern="1200" smtClean="0">
+                <a:solidFill>
+                  <a:schemeClr val="tx1">
+                    <a:lumMod val="75000"/>
+                    <a:lumOff val="25000"/>
+                  </a:schemeClr>
+                </a:solidFill>
+                <a:latin typeface="+mn-lt"/>
+                <a:ea typeface="+mn-ea"/>
+                <a:cs typeface="+mn-cs"/>
+              </a:defRPr>
+            </a:lvl3pPr>
+            <a:lvl4pPr marL="1600200" indent="-228600" algn="l" defTabSz="914400" rtl="0" eaLnBrk="1" latinLnBrk="0" hangingPunct="1">
+              <a:lnSpc>
+                <a:spcPts val="1800"/>
+              </a:lnSpc>
+              <a:spcBef>
+                <a:spcPts val="1000"/>
+              </a:spcBef>
+              <a:spcAft>
+                <a:spcPts val="1000"/>
+              </a:spcAft>
+              <a:buFont typeface="Arial" panose="020B0604020202020204" pitchFamily="34" charset="0"/>
+              <a:buChar char="•"/>
+              <a:defRPr lang="en-US" sz="1200" kern="1200" smtClean="0">
+                <a:solidFill>
+                  <a:schemeClr val="tx1">
+                    <a:lumMod val="75000"/>
+                    <a:lumOff val="25000"/>
+                  </a:schemeClr>
+                </a:solidFill>
+                <a:latin typeface="+mn-lt"/>
+                <a:ea typeface="+mn-ea"/>
+                <a:cs typeface="+mn-cs"/>
+              </a:defRPr>
+            </a:lvl4pPr>
+            <a:lvl5pPr marL="2057400" indent="-228600" algn="l" defTabSz="914400" rtl="0" eaLnBrk="1" latinLnBrk="0" hangingPunct="1">
+              <a:lnSpc>
+                <a:spcPts val="1800"/>
+              </a:lnSpc>
+              <a:spcBef>
+                <a:spcPts val="1000"/>
+              </a:spcBef>
+              <a:spcAft>
+                <a:spcPts val="1000"/>
+              </a:spcAft>
+              <a:buFont typeface="Arial" panose="020B0604020202020204" pitchFamily="34" charset="0"/>
+              <a:buChar char="•"/>
+              <a:defRPr lang="en-US" sz="1200" kern="1200">
+                <a:solidFill>
+                  <a:schemeClr val="tx1">
+                    <a:lumMod val="75000"/>
+                    <a:lumOff val="25000"/>
+                  </a:schemeClr>
+                </a:solidFill>
+                <a:latin typeface="+mn-lt"/>
+                <a:ea typeface="+mn-ea"/>
+                <a:cs typeface="+mn-cs"/>
+              </a:defRPr>
+            </a:lvl5pPr>
+            <a:lvl6pPr marL="2514600" indent="-228600" algn="l" defTabSz="914400" rtl="0" eaLnBrk="1" latinLnBrk="0" hangingPunct="1">
+              <a:lnSpc>
+                <a:spcPct val="90000"/>
+              </a:lnSpc>
+              <a:spcBef>
+                <a:spcPct val="30000"/>
+              </a:spcBef>
+              <a:buFont typeface="Arial" panose="020B0604020202020204" pitchFamily="34" charset="0"/>
+              <a:buChar char="•"/>
+              <a:defRPr sz="1800" kern="1200">
+                <a:solidFill>
+                  <a:schemeClr val="tx1"/>
+                </a:solidFill>
+                <a:latin typeface="+mn-lt"/>
+                <a:ea typeface="+mn-ea"/>
+                <a:cs typeface="+mn-cs"/>
+              </a:defRPr>
+            </a:lvl6pPr>
+            <a:lvl7pPr marL="2971800" indent="-228600" algn="l" defTabSz="914400" rtl="0" eaLnBrk="1" latinLnBrk="0" hangingPunct="1">
+              <a:lnSpc>
+                <a:spcPct val="90000"/>
+              </a:lnSpc>
+              <a:spcBef>
+                <a:spcPct val="30000"/>
+              </a:spcBef>
+              <a:buFont typeface="Arial" panose="020B0604020202020204" pitchFamily="34" charset="0"/>
+              <a:buChar char="•"/>
+              <a:defRPr sz="1800" kern="1200">
+                <a:solidFill>
+                  <a:schemeClr val="tx1"/>
+                </a:solidFill>
+                <a:latin typeface="+mn-lt"/>
+                <a:ea typeface="+mn-ea"/>
+                <a:cs typeface="+mn-cs"/>
+              </a:defRPr>
+            </a:lvl7pPr>
+            <a:lvl8pPr marL="3429000" indent="-228600" algn="l" defTabSz="914400" rtl="0" eaLnBrk="1" latinLnBrk="0" hangingPunct="1">
+              <a:lnSpc>
+                <a:spcPct val="90000"/>
+              </a:lnSpc>
+              <a:spcBef>
+                <a:spcPct val="30000"/>
+              </a:spcBef>
+              <a:buFont typeface="Arial" panose="020B0604020202020204" pitchFamily="34" charset="0"/>
+              <a:buChar char="•"/>
+              <a:defRPr sz="1800" kern="1200">
+                <a:solidFill>
+                  <a:schemeClr val="tx1"/>
+                </a:solidFill>
+                <a:latin typeface="+mn-lt"/>
+                <a:ea typeface="+mn-ea"/>
+                <a:cs typeface="+mn-cs"/>
+              </a:defRPr>
+            </a:lvl8pPr>
+            <a:lvl9pPr marL="3886200" indent="-228600" algn="l" defTabSz="914400" rtl="0" eaLnBrk="1" latinLnBrk="0" hangingPunct="1">
+              <a:lnSpc>
+                <a:spcPct val="90000"/>
+              </a:lnSpc>
+              <a:spcBef>
+                <a:spcPct val="30000"/>
+              </a:spcBef>
+              <a:buFont typeface="Arial" panose="020B0604020202020204" pitchFamily="34" charset="0"/>
+              <a:buChar char="•"/>
+              <a:defRPr sz="1800" kern="1200">
+                <a:solidFill>
+                  <a:schemeClr val="tx1"/>
+                </a:solidFill>
+                <a:latin typeface="+mn-lt"/>
+                <a:ea typeface="+mn-ea"/>
+                <a:cs typeface="+mn-cs"/>
+              </a:defRPr>
+            </a:lvl9pPr>
+          </a:lstStyle>
+          <a:p>
+            <a:pPr marL="0" indent="0">
+              <a:spcAft>
+                <a:spcPts val="450"/>
+              </a:spcAft>
+              <a:buNone/>
+              <a:defRPr/>
+            </a:pPr>
+            <a:endParaRPr lang="zh-CN" altLang="en-US" sz="900" dirty="0">
+              <a:latin typeface="Microsoft YaHei UI" panose="020B0503020204020204" pitchFamily="34" charset="-122"/>
+              <a:ea typeface="Microsoft YaHei UI" panose="020B0503020204020204" pitchFamily="34" charset="-122"/>
+              <a:cs typeface="Segoe UI" panose="020B0502040204020203" pitchFamily="34" charset="0"/>
+            </a:endParaRPr>
+          </a:p>
+        </p:txBody>
+      </p:sp>
+      <p:sp>
+        <p:nvSpPr>
+          <p:cNvPr id="2" name="矩形 1">
+            <a:extLst>
+              <a:ext uri="{FF2B5EF4-FFF2-40B4-BE49-F238E27FC236}">
+                <a16:creationId xmlns:a16="http://schemas.microsoft.com/office/drawing/2014/main" id="{61913634-122C-430D-BE79-95FE908A90D7}"/>
+              </a:ext>
+            </a:extLst>
+          </p:cNvPr>
+          <p:cNvSpPr/>
+          <p:nvPr/>
+        </p:nvSpPr>
+        <p:spPr>
+          <a:xfrm>
+            <a:off x="351020" y="1367235"/>
+            <a:ext cx="8386771" cy="5113323"/>
+          </a:xfrm>
+          <a:prstGeom prst="rect">
+            <a:avLst/>
+          </a:prstGeom>
+        </p:spPr>
+        <p:txBody>
+          <a:bodyPr wrap="square">
+            <a:spAutoFit/>
+          </a:bodyPr>
+          <a:lstStyle/>
+          <a:p>
+            <a:pPr marL="342900" indent="-342900">
+              <a:lnSpc>
+                <a:spcPct val="150000"/>
+              </a:lnSpc>
+              <a:buClr>
+                <a:srgbClr val="0070C0"/>
+              </a:buClr>
+              <a:buFont typeface="Arial" panose="020B0604020202020204" pitchFamily="34" charset="0"/>
+              <a:buChar char="•"/>
+            </a:pPr>
+            <a:r>
+              <a:rPr lang="en-US" altLang="zh-CN" sz="2000" b="1" dirty="0">
+                <a:latin typeface="Segoe UI (Textkörper)"/>
+              </a:rPr>
+              <a:t>Challenges:</a:t>
+            </a:r>
+          </a:p>
+          <a:p>
+            <a:pPr marL="800100" lvl="1" indent="-342900">
+              <a:lnSpc>
+                <a:spcPct val="150000"/>
+              </a:lnSpc>
+              <a:buClr>
+                <a:srgbClr val="0070C0"/>
+              </a:buClr>
+              <a:buFont typeface="Arial" panose="020B0604020202020204" pitchFamily="34" charset="0"/>
+              <a:buChar char="•"/>
+            </a:pPr>
+            <a:r>
+              <a:rPr lang="en-US" altLang="zh-CN" sz="2000" dirty="0">
+                <a:latin typeface="Segoe UI (Textkörper)"/>
+              </a:rPr>
+              <a:t>Storage issues:</a:t>
+            </a:r>
+          </a:p>
+          <a:p>
+            <a:pPr marL="1257300" lvl="2" indent="-342900">
+              <a:lnSpc>
+                <a:spcPct val="150000"/>
+              </a:lnSpc>
+              <a:buClr>
+                <a:srgbClr val="0070C0"/>
+              </a:buClr>
+              <a:buFont typeface="Arial" panose="020B0604020202020204" pitchFamily="34" charset="0"/>
+              <a:buChar char="•"/>
+            </a:pPr>
+            <a:r>
+              <a:rPr lang="en-US" altLang="zh-CN" sz="2000" dirty="0">
+                <a:latin typeface="Segoe UI (Textkörper)"/>
+              </a:rPr>
+              <a:t>Over 85gb in .zip format was too much for Kaggle / Google </a:t>
+            </a:r>
+            <a:r>
+              <a:rPr lang="en-US" altLang="zh-CN" sz="2000" dirty="0" err="1">
+                <a:latin typeface="Segoe UI (Textkörper)"/>
+              </a:rPr>
+              <a:t>Colab</a:t>
+            </a:r>
+            <a:endParaRPr lang="en-US" altLang="zh-CN" sz="2000" dirty="0">
+              <a:latin typeface="Segoe UI (Textkörper)"/>
+            </a:endParaRPr>
+          </a:p>
+          <a:p>
+            <a:pPr marL="800100" lvl="1" indent="-342900">
+              <a:lnSpc>
+                <a:spcPct val="150000"/>
+              </a:lnSpc>
+              <a:buClr>
+                <a:srgbClr val="0070C0"/>
+              </a:buClr>
+              <a:buFont typeface="Arial" panose="020B0604020202020204" pitchFamily="34" charset="0"/>
+              <a:buChar char="•"/>
+            </a:pPr>
+            <a:r>
+              <a:rPr lang="en-US" altLang="zh-CN" sz="2000" dirty="0">
+                <a:latin typeface="Segoe UI (Textkörper)"/>
+              </a:rPr>
+              <a:t>Memory issues:</a:t>
+            </a:r>
+          </a:p>
+          <a:p>
+            <a:pPr marL="1257300" lvl="2" indent="-342900">
+              <a:lnSpc>
+                <a:spcPct val="150000"/>
+              </a:lnSpc>
+              <a:buClr>
+                <a:srgbClr val="0070C0"/>
+              </a:buClr>
+              <a:buFont typeface="Arial" panose="020B0604020202020204" pitchFamily="34" charset="0"/>
+              <a:buChar char="•"/>
+            </a:pPr>
+            <a:r>
+              <a:rPr lang="en-US" altLang="zh-CN" sz="2000" dirty="0">
+                <a:latin typeface="Segoe UI (Textkörper)"/>
+              </a:rPr>
+              <a:t>Own computer had insufficient memory, e.g. 4GB ram</a:t>
+            </a:r>
+          </a:p>
+          <a:p>
+            <a:pPr marL="342900" indent="-342900">
+              <a:lnSpc>
+                <a:spcPct val="150000"/>
+              </a:lnSpc>
+              <a:buClr>
+                <a:srgbClr val="0070C0"/>
+              </a:buClr>
+              <a:buFont typeface="Arial" panose="020B0604020202020204" pitchFamily="34" charset="0"/>
+              <a:buChar char="•"/>
+            </a:pPr>
+            <a:r>
+              <a:rPr lang="en-US" altLang="zh-CN" sz="2000" dirty="0">
+                <a:latin typeface="Segoe UI (Textkörper)"/>
+              </a:rPr>
+              <a:t>As a solution the computation was executed in the lab</a:t>
+            </a:r>
+            <a:br>
+              <a:rPr lang="en-US" altLang="zh-CN" sz="2000" dirty="0">
+                <a:latin typeface="Segoe UI (Textkörper)"/>
+              </a:rPr>
+            </a:br>
+            <a:endParaRPr lang="en-US" altLang="zh-CN" sz="2000" dirty="0">
+              <a:latin typeface="Segoe UI (Textkörper)"/>
+            </a:endParaRPr>
+          </a:p>
+          <a:p>
+            <a:pPr>
+              <a:lnSpc>
+                <a:spcPct val="150000"/>
+              </a:lnSpc>
+            </a:pPr>
+            <a:br>
+              <a:rPr lang="en-US" altLang="zh-CN" sz="2000" dirty="0">
+                <a:latin typeface="Segoe UI (Textkörper)"/>
+              </a:rPr>
+            </a:br>
+            <a:br>
+              <a:rPr lang="en-US" altLang="zh-CN" sz="2000" dirty="0">
+                <a:latin typeface="Segoe UI (Textkörper)"/>
+              </a:rPr>
+            </a:br>
+            <a:endParaRPr lang="zh-CN" altLang="en-US" sz="2000" dirty="0">
+              <a:latin typeface="Segoe UI (Textkörper)"/>
+            </a:endParaRPr>
+          </a:p>
+        </p:txBody>
+      </p:sp>
+    </p:spTree>
+    <p:extLst>
+      <p:ext uri="{BB962C8B-B14F-4D97-AF65-F5344CB8AC3E}">
+        <p14:creationId xmlns:p14="http://schemas.microsoft.com/office/powerpoint/2010/main" val="4008320974"/>
+      </p:ext>
+    </p:extLst>
+  </p:cSld>
+  <p:clrMapOvr>
+    <a:masterClrMapping/>
+  </p:clrMapOvr>
+  <mc:AlternateContent xmlns:mc="http://schemas.openxmlformats.org/markup-compatibility/2006" xmlns:p14="http://schemas.microsoft.com/office/powerpoint/2010/main">
+    <mc:Choice Requires="p14">
+      <p:transition p14:dur="10"/>
+    </mc:Choice>
+    <mc:Fallback xmlns="">
+      <p:transition/>
+    </mc:Fallback>
+  </mc:AlternateContent>
+</p:sld>
+</file>
+
+<file path=ppt/slides/slide7.xml><?xml version="1.0" encoding="utf-8"?>
+<p:sld xmlns:a="http://schemas.openxmlformats.org/drawingml/2006/main" xmlns:r="http://schemas.openxmlformats.org/officeDocument/2006/relationships" xmlns:p="http://schemas.openxmlformats.org/presentationml/2006/main">
+  <p:cSld>
+    <p:spTree>
+      <p:nvGrpSpPr>
+        <p:cNvPr id="1" name=""/>
+        <p:cNvGrpSpPr/>
+        <p:nvPr/>
+      </p:nvGrpSpPr>
+      <p:grpSpPr>
+        <a:xfrm>
+          <a:off x="0" y="0"/>
+          <a:ext cx="0" cy="0"/>
+          <a:chOff x="0" y="0"/>
+          <a:chExt cx="0" cy="0"/>
+        </a:xfrm>
+      </p:grpSpPr>
+      <p:sp>
+        <p:nvSpPr>
+          <p:cNvPr id="8" name="标题 7"/>
+          <p:cNvSpPr>
+            <a:spLocks noGrp="1"/>
+          </p:cNvSpPr>
+          <p:nvPr>
+            <p:ph type="title"/>
+          </p:nvPr>
+        </p:nvSpPr>
+        <p:spPr/>
+        <p:txBody>
+          <a:bodyPr rtlCol="0">
+            <a:noAutofit/>
+          </a:bodyPr>
+          <a:lstStyle/>
+          <a:p>
+            <a:r>
+              <a:rPr lang="en-US" altLang="zh-CN" b="1" dirty="0"/>
               <a:t>Related Work</a:t>
             </a:r>
             <a:endParaRPr lang="zh-CN" altLang="en-US" dirty="0">
@@ -9254,7 +9752,7 @@
 </p:sld>
 </file>
 
-<file path=ppt/slides/slide7.xml><?xml version="1.0" encoding="utf-8"?>
+<file path=ppt/slides/slide8.xml><?xml version="1.0" encoding="utf-8"?>
 <p:sld xmlns:a="http://schemas.openxmlformats.org/drawingml/2006/main" xmlns:r="http://schemas.openxmlformats.org/officeDocument/2006/relationships" xmlns:p="http://schemas.openxmlformats.org/presentationml/2006/main">
   <p:cSld>
     <p:spTree>
@@ -9718,7 +10216,7 @@
 </p:sld>
 </file>
 
-<file path=ppt/slides/slide8.xml><?xml version="1.0" encoding="utf-8"?>
+<file path=ppt/slides/slide9.xml><?xml version="1.0" encoding="utf-8"?>
 <p:sld xmlns:a="http://schemas.openxmlformats.org/drawingml/2006/main" xmlns:r="http://schemas.openxmlformats.org/officeDocument/2006/relationships" xmlns:p="http://schemas.openxmlformats.org/presentationml/2006/main">
   <p:cSld>
     <p:spTree>
@@ -10157,489 +10655,6 @@
     <p:extLst>
       <p:ext uri="{BB962C8B-B14F-4D97-AF65-F5344CB8AC3E}">
         <p14:creationId xmlns:p14="http://schemas.microsoft.com/office/powerpoint/2010/main" val="211187460"/>
-      </p:ext>
-    </p:extLst>
-  </p:cSld>
-  <p:clrMapOvr>
-    <a:masterClrMapping/>
-  </p:clrMapOvr>
-  <mc:AlternateContent xmlns:mc="http://schemas.openxmlformats.org/markup-compatibility/2006" xmlns:p14="http://schemas.microsoft.com/office/powerpoint/2010/main">
-    <mc:Choice Requires="p14">
-      <p:transition p14:dur="10"/>
-    </mc:Choice>
-    <mc:Fallback xmlns="">
-      <p:transition/>
-    </mc:Fallback>
-  </mc:AlternateContent>
-</p:sld>
-</file>
-
-<file path=ppt/slides/slide9.xml><?xml version="1.0" encoding="utf-8"?>
-<p:sld xmlns:a="http://schemas.openxmlformats.org/drawingml/2006/main" xmlns:r="http://schemas.openxmlformats.org/officeDocument/2006/relationships" xmlns:p="http://schemas.openxmlformats.org/presentationml/2006/main">
-  <p:cSld>
-    <p:spTree>
-      <p:nvGrpSpPr>
-        <p:cNvPr id="1" name=""/>
-        <p:cNvGrpSpPr/>
-        <p:nvPr/>
-      </p:nvGrpSpPr>
-      <p:grpSpPr>
-        <a:xfrm>
-          <a:off x="0" y="0"/>
-          <a:ext cx="0" cy="0"/>
-          <a:chOff x="0" y="0"/>
-          <a:chExt cx="0" cy="0"/>
-        </a:xfrm>
-      </p:grpSpPr>
-      <p:sp>
-        <p:nvSpPr>
-          <p:cNvPr id="8" name="标题 7"/>
-          <p:cNvSpPr>
-            <a:spLocks noGrp="1"/>
-          </p:cNvSpPr>
-          <p:nvPr>
-            <p:ph type="title"/>
-          </p:nvPr>
-        </p:nvSpPr>
-        <p:spPr/>
-        <p:txBody>
-          <a:bodyPr rtlCol="0">
-            <a:noAutofit/>
-          </a:bodyPr>
-          <a:lstStyle/>
-          <a:p>
-            <a:r>
-              <a:rPr lang="en-US" altLang="zh-CN" b="1" dirty="0"/>
-              <a:t>Proposed Approach</a:t>
-            </a:r>
-            <a:endParaRPr lang="zh-CN" altLang="en-US" dirty="0">
-              <a:cs typeface="Segoe UI Light" panose="020B0502040204020203" pitchFamily="34" charset="0"/>
-            </a:endParaRPr>
-          </a:p>
-        </p:txBody>
-      </p:sp>
-      <p:sp>
-        <p:nvSpPr>
-          <p:cNvPr id="38" name="内容占位符 17"/>
-          <p:cNvSpPr txBox="1">
-            <a:spLocks/>
-          </p:cNvSpPr>
-          <p:nvPr/>
-        </p:nvSpPr>
-        <p:spPr>
-          <a:xfrm>
-            <a:off x="406208" y="2000781"/>
-            <a:ext cx="3241278" cy="2903639"/>
-          </a:xfrm>
-          <a:prstGeom prst="rect">
-            <a:avLst/>
-          </a:prstGeom>
-        </p:spPr>
-        <p:txBody>
-          <a:bodyPr vert="horz" lIns="68580" tIns="34290" rIns="68580" bIns="34290" rtlCol="0">
-            <a:normAutofit/>
-          </a:bodyPr>
-          <a:lstStyle>
-            <a:lvl1pPr marL="228600" indent="-228600" algn="l" defTabSz="914400" rtl="0" eaLnBrk="1" latinLnBrk="0" hangingPunct="1">
-              <a:lnSpc>
-                <a:spcPts val="1800"/>
-              </a:lnSpc>
-              <a:spcBef>
-                <a:spcPts val="1000"/>
-              </a:spcBef>
-              <a:spcAft>
-                <a:spcPts val="1000"/>
-              </a:spcAft>
-              <a:buFont typeface="Arial" panose="020B0604020202020204" pitchFamily="34" charset="0"/>
-              <a:buChar char="•"/>
-              <a:defRPr lang="en-US" sz="1200" kern="1200" smtClean="0">
-                <a:solidFill>
-                  <a:schemeClr val="tx1">
-                    <a:lumMod val="75000"/>
-                    <a:lumOff val="25000"/>
-                  </a:schemeClr>
-                </a:solidFill>
-                <a:latin typeface="+mn-lt"/>
-                <a:ea typeface="+mn-ea"/>
-                <a:cs typeface="+mn-cs"/>
-              </a:defRPr>
-            </a:lvl1pPr>
-            <a:lvl2pPr marL="685800" indent="-228600" algn="l" defTabSz="914400" rtl="0" eaLnBrk="1" latinLnBrk="0" hangingPunct="1">
-              <a:lnSpc>
-                <a:spcPts val="1800"/>
-              </a:lnSpc>
-              <a:spcBef>
-                <a:spcPts val="1000"/>
-              </a:spcBef>
-              <a:spcAft>
-                <a:spcPts val="1000"/>
-              </a:spcAft>
-              <a:buFont typeface="Arial" panose="020B0604020202020204" pitchFamily="34" charset="0"/>
-              <a:buChar char="•"/>
-              <a:defRPr lang="en-US" sz="1200" kern="1200" smtClean="0">
-                <a:solidFill>
-                  <a:schemeClr val="tx1">
-                    <a:lumMod val="75000"/>
-                    <a:lumOff val="25000"/>
-                  </a:schemeClr>
-                </a:solidFill>
-                <a:latin typeface="+mn-lt"/>
-                <a:ea typeface="+mn-ea"/>
-                <a:cs typeface="+mn-cs"/>
-              </a:defRPr>
-            </a:lvl2pPr>
-            <a:lvl3pPr marL="1143000" indent="-228600" algn="l" defTabSz="914400" rtl="0" eaLnBrk="1" latinLnBrk="0" hangingPunct="1">
-              <a:lnSpc>
-                <a:spcPts val="1800"/>
-              </a:lnSpc>
-              <a:spcBef>
-                <a:spcPts val="1000"/>
-              </a:spcBef>
-              <a:spcAft>
-                <a:spcPts val="1000"/>
-              </a:spcAft>
-              <a:buFont typeface="Arial" panose="020B0604020202020204" pitchFamily="34" charset="0"/>
-              <a:buChar char="•"/>
-              <a:defRPr lang="en-US" sz="1200" kern="1200" smtClean="0">
-                <a:solidFill>
-                  <a:schemeClr val="tx1">
-                    <a:lumMod val="75000"/>
-                    <a:lumOff val="25000"/>
-                  </a:schemeClr>
-                </a:solidFill>
-                <a:latin typeface="+mn-lt"/>
-                <a:ea typeface="+mn-ea"/>
-                <a:cs typeface="+mn-cs"/>
-              </a:defRPr>
-            </a:lvl3pPr>
-            <a:lvl4pPr marL="1600200" indent="-228600" algn="l" defTabSz="914400" rtl="0" eaLnBrk="1" latinLnBrk="0" hangingPunct="1">
-              <a:lnSpc>
-                <a:spcPts val="1800"/>
-              </a:lnSpc>
-              <a:spcBef>
-                <a:spcPts val="1000"/>
-              </a:spcBef>
-              <a:spcAft>
-                <a:spcPts val="1000"/>
-              </a:spcAft>
-              <a:buFont typeface="Arial" panose="020B0604020202020204" pitchFamily="34" charset="0"/>
-              <a:buChar char="•"/>
-              <a:defRPr lang="en-US" sz="1200" kern="1200" smtClean="0">
-                <a:solidFill>
-                  <a:schemeClr val="tx1">
-                    <a:lumMod val="75000"/>
-                    <a:lumOff val="25000"/>
-                  </a:schemeClr>
-                </a:solidFill>
-                <a:latin typeface="+mn-lt"/>
-                <a:ea typeface="+mn-ea"/>
-                <a:cs typeface="+mn-cs"/>
-              </a:defRPr>
-            </a:lvl4pPr>
-            <a:lvl5pPr marL="2057400" indent="-228600" algn="l" defTabSz="914400" rtl="0" eaLnBrk="1" latinLnBrk="0" hangingPunct="1">
-              <a:lnSpc>
-                <a:spcPts val="1800"/>
-              </a:lnSpc>
-              <a:spcBef>
-                <a:spcPts val="1000"/>
-              </a:spcBef>
-              <a:spcAft>
-                <a:spcPts val="1000"/>
-              </a:spcAft>
-              <a:buFont typeface="Arial" panose="020B0604020202020204" pitchFamily="34" charset="0"/>
-              <a:buChar char="•"/>
-              <a:defRPr lang="en-US" sz="1200" kern="1200">
-                <a:solidFill>
-                  <a:schemeClr val="tx1">
-                    <a:lumMod val="75000"/>
-                    <a:lumOff val="25000"/>
-                  </a:schemeClr>
-                </a:solidFill>
-                <a:latin typeface="+mn-lt"/>
-                <a:ea typeface="+mn-ea"/>
-                <a:cs typeface="+mn-cs"/>
-              </a:defRPr>
-            </a:lvl5pPr>
-            <a:lvl6pPr marL="2514600" indent="-228600" algn="l" defTabSz="914400" rtl="0" eaLnBrk="1" latinLnBrk="0" hangingPunct="1">
-              <a:lnSpc>
-                <a:spcPct val="90000"/>
-              </a:lnSpc>
-              <a:spcBef>
-                <a:spcPct val="30000"/>
-              </a:spcBef>
-              <a:buFont typeface="Arial" panose="020B0604020202020204" pitchFamily="34" charset="0"/>
-              <a:buChar char="•"/>
-              <a:defRPr sz="1800" kern="1200">
-                <a:solidFill>
-                  <a:schemeClr val="tx1"/>
-                </a:solidFill>
-                <a:latin typeface="+mn-lt"/>
-                <a:ea typeface="+mn-ea"/>
-                <a:cs typeface="+mn-cs"/>
-              </a:defRPr>
-            </a:lvl6pPr>
-            <a:lvl7pPr marL="2971800" indent="-228600" algn="l" defTabSz="914400" rtl="0" eaLnBrk="1" latinLnBrk="0" hangingPunct="1">
-              <a:lnSpc>
-                <a:spcPct val="90000"/>
-              </a:lnSpc>
-              <a:spcBef>
-                <a:spcPct val="30000"/>
-              </a:spcBef>
-              <a:buFont typeface="Arial" panose="020B0604020202020204" pitchFamily="34" charset="0"/>
-              <a:buChar char="•"/>
-              <a:defRPr sz="1800" kern="1200">
-                <a:solidFill>
-                  <a:schemeClr val="tx1"/>
-                </a:solidFill>
-                <a:latin typeface="+mn-lt"/>
-                <a:ea typeface="+mn-ea"/>
-                <a:cs typeface="+mn-cs"/>
-              </a:defRPr>
-            </a:lvl7pPr>
-            <a:lvl8pPr marL="3429000" indent="-228600" algn="l" defTabSz="914400" rtl="0" eaLnBrk="1" latinLnBrk="0" hangingPunct="1">
-              <a:lnSpc>
-                <a:spcPct val="90000"/>
-              </a:lnSpc>
-              <a:spcBef>
-                <a:spcPct val="30000"/>
-              </a:spcBef>
-              <a:buFont typeface="Arial" panose="020B0604020202020204" pitchFamily="34" charset="0"/>
-              <a:buChar char="•"/>
-              <a:defRPr sz="1800" kern="1200">
-                <a:solidFill>
-                  <a:schemeClr val="tx1"/>
-                </a:solidFill>
-                <a:latin typeface="+mn-lt"/>
-                <a:ea typeface="+mn-ea"/>
-                <a:cs typeface="+mn-cs"/>
-              </a:defRPr>
-            </a:lvl8pPr>
-            <a:lvl9pPr marL="3886200" indent="-228600" algn="l" defTabSz="914400" rtl="0" eaLnBrk="1" latinLnBrk="0" hangingPunct="1">
-              <a:lnSpc>
-                <a:spcPct val="90000"/>
-              </a:lnSpc>
-              <a:spcBef>
-                <a:spcPct val="30000"/>
-              </a:spcBef>
-              <a:buFont typeface="Arial" panose="020B0604020202020204" pitchFamily="34" charset="0"/>
-              <a:buChar char="•"/>
-              <a:defRPr sz="1800" kern="1200">
-                <a:solidFill>
-                  <a:schemeClr val="tx1"/>
-                </a:solidFill>
-                <a:latin typeface="+mn-lt"/>
-                <a:ea typeface="+mn-ea"/>
-                <a:cs typeface="+mn-cs"/>
-              </a:defRPr>
-            </a:lvl9pPr>
-          </a:lstStyle>
-          <a:p>
-            <a:pPr marL="0" indent="0">
-              <a:spcAft>
-                <a:spcPts val="450"/>
-              </a:spcAft>
-              <a:buNone/>
-              <a:defRPr/>
-            </a:pPr>
-            <a:endParaRPr lang="zh-CN" altLang="en-US" sz="900" dirty="0">
-              <a:latin typeface="Microsoft YaHei UI" panose="020B0503020204020204" pitchFamily="34" charset="-122"/>
-              <a:ea typeface="Microsoft YaHei UI" panose="020B0503020204020204" pitchFamily="34" charset="-122"/>
-              <a:cs typeface="Segoe UI" panose="020B0502040204020203" pitchFamily="34" charset="0"/>
-            </a:endParaRPr>
-          </a:p>
-        </p:txBody>
-      </p:sp>
-      <p:sp>
-        <p:nvSpPr>
-          <p:cNvPr id="2" name="矩形 1">
-            <a:extLst>
-              <a:ext uri="{FF2B5EF4-FFF2-40B4-BE49-F238E27FC236}">
-                <a16:creationId xmlns:a16="http://schemas.microsoft.com/office/drawing/2014/main" id="{61913634-122C-430D-BE79-95FE908A90D7}"/>
-              </a:ext>
-            </a:extLst>
-          </p:cNvPr>
-          <p:cNvSpPr/>
-          <p:nvPr/>
-        </p:nvSpPr>
-        <p:spPr>
-          <a:xfrm>
-            <a:off x="351020" y="1367235"/>
-            <a:ext cx="8386771" cy="4189993"/>
-          </a:xfrm>
-          <a:prstGeom prst="rect">
-            <a:avLst/>
-          </a:prstGeom>
-        </p:spPr>
-        <p:txBody>
-          <a:bodyPr wrap="square">
-            <a:spAutoFit/>
-          </a:bodyPr>
-          <a:lstStyle/>
-          <a:p>
-            <a:pPr marL="342900" indent="-342900">
-              <a:lnSpc>
-                <a:spcPct val="150000"/>
-              </a:lnSpc>
-              <a:buClr>
-                <a:srgbClr val="0070C0"/>
-              </a:buClr>
-              <a:buFont typeface="Arial" panose="020B0604020202020204" pitchFamily="34" charset="0"/>
-              <a:buChar char="•"/>
-            </a:pPr>
-            <a:r>
-              <a:rPr lang="en-US" altLang="zh-CN" sz="2000" b="1" dirty="0">
-                <a:latin typeface="Segoe UI (Textkörper)"/>
-              </a:rPr>
-              <a:t>Data processing:</a:t>
-            </a:r>
-          </a:p>
-          <a:p>
-            <a:pPr marL="800100" lvl="1" indent="-342900">
-              <a:lnSpc>
-                <a:spcPct val="150000"/>
-              </a:lnSpc>
-              <a:buClr>
-                <a:srgbClr val="0070C0"/>
-              </a:buClr>
-              <a:buFont typeface="Arial" panose="020B0604020202020204" pitchFamily="34" charset="0"/>
-              <a:buChar char="•"/>
-            </a:pPr>
-            <a:r>
-              <a:rPr lang="en-US" altLang="zh-CN" sz="2000" dirty="0">
-                <a:latin typeface="Segoe UI (Textkörper)"/>
-              </a:rPr>
-              <a:t>Load the data (images with annotations)</a:t>
-            </a:r>
-          </a:p>
-          <a:p>
-            <a:pPr marL="800100" lvl="1" indent="-342900">
-              <a:lnSpc>
-                <a:spcPct val="150000"/>
-              </a:lnSpc>
-              <a:buClr>
-                <a:srgbClr val="0070C0"/>
-              </a:buClr>
-              <a:buFont typeface="Arial" panose="020B0604020202020204" pitchFamily="34" charset="0"/>
-              <a:buChar char="•"/>
-            </a:pPr>
-            <a:r>
-              <a:rPr lang="en-US" altLang="zh-CN" sz="2000" dirty="0">
-                <a:latin typeface="Segoe UI (Textkörper)"/>
-              </a:rPr>
-              <a:t>Augment the data:</a:t>
-            </a:r>
-          </a:p>
-          <a:p>
-            <a:pPr marL="1257300" lvl="2" indent="-342900">
-              <a:lnSpc>
-                <a:spcPct val="150000"/>
-              </a:lnSpc>
-              <a:buClr>
-                <a:srgbClr val="0070C0"/>
-              </a:buClr>
-              <a:buFont typeface="Arial" panose="020B0604020202020204" pitchFamily="34" charset="0"/>
-              <a:buChar char="•"/>
-            </a:pPr>
-            <a:r>
-              <a:rPr lang="en-US" altLang="zh-CN" sz="2000" dirty="0">
-                <a:latin typeface="Segoe UI (Textkörper)"/>
-              </a:rPr>
-              <a:t>Uniform size of 299x299 resolution</a:t>
-            </a:r>
-          </a:p>
-          <a:p>
-            <a:pPr marL="1257300" lvl="2" indent="-342900">
-              <a:lnSpc>
-                <a:spcPct val="150000"/>
-              </a:lnSpc>
-              <a:buClr>
-                <a:srgbClr val="0070C0"/>
-              </a:buClr>
-              <a:buFont typeface="Arial" panose="020B0604020202020204" pitchFamily="34" charset="0"/>
-              <a:buChar char="•"/>
-            </a:pPr>
-            <a:r>
-              <a:rPr lang="en-US" altLang="zh-CN" sz="2000" dirty="0">
-                <a:latin typeface="Segoe UI (Textkörper)"/>
-              </a:rPr>
-              <a:t>For color: brightness, contrast, saturation, hue modifications</a:t>
-            </a:r>
-          </a:p>
-          <a:p>
-            <a:pPr marL="1257300" lvl="2" indent="-342900">
-              <a:lnSpc>
-                <a:spcPct val="150000"/>
-              </a:lnSpc>
-              <a:buClr>
-                <a:srgbClr val="0070C0"/>
-              </a:buClr>
-              <a:buFont typeface="Arial" panose="020B0604020202020204" pitchFamily="34" charset="0"/>
-              <a:buChar char="•"/>
-            </a:pPr>
-            <a:r>
-              <a:rPr lang="en-US" altLang="zh-CN" sz="2000" dirty="0">
-                <a:latin typeface="Segoe UI (Textkörper)"/>
-              </a:rPr>
-              <a:t>For image: Scaling, flipping, center crop</a:t>
-            </a:r>
-          </a:p>
-          <a:p>
-            <a:pPr marL="1257300" lvl="2" indent="-342900">
-              <a:lnSpc>
-                <a:spcPct val="150000"/>
-              </a:lnSpc>
-              <a:buClr>
-                <a:srgbClr val="0070C0"/>
-              </a:buClr>
-              <a:buFont typeface="Arial" panose="020B0604020202020204" pitchFamily="34" charset="0"/>
-              <a:buChar char="•"/>
-            </a:pPr>
-            <a:endParaRPr lang="en-US" altLang="zh-CN" sz="2000" dirty="0">
-              <a:latin typeface="Segoe UI (Textkörper)"/>
-            </a:endParaRPr>
-          </a:p>
-          <a:p>
-            <a:pPr marL="342900" indent="-342900">
-              <a:lnSpc>
-                <a:spcPct val="150000"/>
-              </a:lnSpc>
-              <a:buClr>
-                <a:srgbClr val="0070C0"/>
-              </a:buClr>
-              <a:buFont typeface="Arial" panose="020B0604020202020204" pitchFamily="34" charset="0"/>
-              <a:buChar char="•"/>
-            </a:pPr>
-            <a:r>
-              <a:rPr lang="en-US" altLang="zh-CN" sz="2000" b="1" dirty="0">
-                <a:latin typeface="Segoe UI (Textkörper)"/>
-              </a:rPr>
-              <a:t>Training:</a:t>
-            </a:r>
-          </a:p>
-          <a:p>
-            <a:pPr marL="800100" lvl="1" indent="-342900">
-              <a:lnSpc>
-                <a:spcPct val="150000"/>
-              </a:lnSpc>
-              <a:buClr>
-                <a:srgbClr val="0070C0"/>
-              </a:buClr>
-              <a:buFont typeface="Arial" panose="020B0604020202020204" pitchFamily="34" charset="0"/>
-              <a:buChar char="•"/>
-            </a:pPr>
-            <a:r>
-              <a:rPr lang="en-US" altLang="zh-CN" sz="2000" dirty="0">
-                <a:latin typeface="Segoe UI (Textkörper)"/>
-              </a:rPr>
-              <a:t>Tune hyperparameters, epochs and batch sizes</a:t>
-            </a:r>
-          </a:p>
-        </p:txBody>
-      </p:sp>
-    </p:spTree>
-    <p:extLst>
-      <p:ext uri="{BB962C8B-B14F-4D97-AF65-F5344CB8AC3E}">
-        <p14:creationId xmlns:p14="http://schemas.microsoft.com/office/powerpoint/2010/main" val="2095750614"/>
       </p:ext>
     </p:extLst>
   </p:cSld>
@@ -11415,6 +11430,15 @@
 </file>
 
 <file path=customXml/item1.xml><?xml version="1.0" encoding="utf-8"?>
+<?mso-contentType ?>
+<FormTemplates xmlns="http://schemas.microsoft.com/sharepoint/v3/contenttype/forms">
+  <Display>DocumentLibraryForm</Display>
+  <Edit>DocumentLibraryForm</Edit>
+  <New>DocumentLibraryForm</New>
+</FormTemplates>
+</file>
+
+<file path=customXml/item2.xml><?xml version="1.0" encoding="utf-8"?>
 <ct:contentTypeSchema xmlns:ct="http://schemas.microsoft.com/office/2006/metadata/contentType" xmlns:ma="http://schemas.microsoft.com/office/2006/metadata/properties/metaAttributes" ct:_="" ma:_="" ma:contentTypeName="Document" ma:contentTypeID="0x01010079F111ED35F8CC479449609E8A0923A6" ma:contentTypeVersion="12" ma:contentTypeDescription="Create a new document." ma:contentTypeScope="" ma:versionID="a8a52e8c320b9a064ae3583ae3861c92">
   <xsd:schema xmlns:xsd="http://www.w3.org/2001/XMLSchema" xmlns:xs="http://www.w3.org/2001/XMLSchema" xmlns:p="http://schemas.microsoft.com/office/2006/metadata/properties" xmlns:ns2="71af3243-3dd4-4a8d-8c0d-dd76da1f02a5" xmlns:ns3="16c05727-aa75-4e4a-9b5f-8a80a1165891" targetNamespace="http://schemas.microsoft.com/office/2006/metadata/properties" ma:root="true" ma:fieldsID="88020cb39231a0945110f9cd888b521a" ns2:_="" ns3:_="">
     <xsd:import namespace="71af3243-3dd4-4a8d-8c0d-dd76da1f02a5"/>
@@ -11635,15 +11659,6 @@
 </ct:contentTypeSchema>
 </file>
 
-<file path=customXml/item2.xml><?xml version="1.0" encoding="utf-8"?>
-<?mso-contentType ?>
-<FormTemplates xmlns="http://schemas.microsoft.com/sharepoint/v3/contenttype/forms">
-  <Display>DocumentLibraryForm</Display>
-  <Edit>DocumentLibraryForm</Edit>
-  <New>DocumentLibraryForm</New>
-</FormTemplates>
-</file>
-
 <file path=customXml/item3.xml><?xml version="1.0" encoding="utf-8"?>
 <p:properties xmlns:p="http://schemas.microsoft.com/office/2006/metadata/properties" xmlns:xsi="http://www.w3.org/2001/XMLSchema-instance" xmlns:pc="http://schemas.microsoft.com/office/infopath/2007/PartnerControls">
   <documentManagement>
@@ -11654,6 +11669,14 @@
 </file>
 
 <file path=customXml/itemProps1.xml><?xml version="1.0" encoding="utf-8"?>
+<ds:datastoreItem xmlns:ds="http://schemas.openxmlformats.org/officeDocument/2006/customXml" ds:itemID="{7EE8C63A-4744-4DE4-BB49-0FF0B5375C60}">
+  <ds:schemaRefs>
+    <ds:schemaRef ds:uri="http://schemas.microsoft.com/sharepoint/v3/contenttype/forms"/>
+  </ds:schemaRefs>
+</ds:datastoreItem>
+</file>
+
+<file path=customXml/itemProps2.xml><?xml version="1.0" encoding="utf-8"?>
 <ds:datastoreItem xmlns:ds="http://schemas.openxmlformats.org/officeDocument/2006/customXml" ds:itemID="{FD7FC771-7DFE-49DA-B577-71181BFBCB2E}">
   <ds:schemaRefs>
     <ds:schemaRef ds:uri="http://schemas.microsoft.com/office/2006/metadata/contentType"/>
@@ -11668,14 +11691,6 @@
     <ds:schemaRef ds:uri="http://purl.org/dc/elements/1.1/"/>
     <ds:schemaRef ds:uri="http://purl.org/dc/terms/"/>
     <ds:schemaRef ds:uri="http://schemas.microsoft.com/internal/obd"/>
-  </ds:schemaRefs>
-</ds:datastoreItem>
-</file>
-
-<file path=customXml/itemProps2.xml><?xml version="1.0" encoding="utf-8"?>
-<ds:datastoreItem xmlns:ds="http://schemas.openxmlformats.org/officeDocument/2006/customXml" ds:itemID="{7EE8C63A-4744-4DE4-BB49-0FF0B5375C60}">
-  <ds:schemaRefs>
-    <ds:schemaRef ds:uri="http://schemas.microsoft.com/sharepoint/v3/contenttype/forms"/>
   </ds:schemaRefs>
 </ds:datastoreItem>
 </file>

</xml_diff>

<commit_message>
Updated proposed approach with different network
</commit_message>
<xml_diff>
--- a/Final project/Final_presentation.pptx
+++ b/Final project/Final_presentation.pptx
@@ -5,10 +5,10 @@
     <p:sldMasterId id="2147483660" r:id="rId4"/>
   </p:sldMasterIdLst>
   <p:notesMasterIdLst>
-    <p:notesMasterId r:id="rId19"/>
+    <p:notesMasterId r:id="rId21"/>
   </p:notesMasterIdLst>
   <p:handoutMasterIdLst>
-    <p:handoutMasterId r:id="rId20"/>
+    <p:handoutMasterId r:id="rId22"/>
   </p:handoutMasterIdLst>
   <p:sldIdLst>
     <p:sldId id="256" r:id="rId5"/>
@@ -19,12 +19,14 @@
     <p:sldId id="307" r:id="rId10"/>
     <p:sldId id="292" r:id="rId11"/>
     <p:sldId id="305" r:id="rId12"/>
-    <p:sldId id="293" r:id="rId13"/>
-    <p:sldId id="301" r:id="rId14"/>
-    <p:sldId id="303" r:id="rId15"/>
-    <p:sldId id="302" r:id="rId16"/>
-    <p:sldId id="297" r:id="rId17"/>
-    <p:sldId id="299" r:id="rId18"/>
+    <p:sldId id="308" r:id="rId13"/>
+    <p:sldId id="309" r:id="rId14"/>
+    <p:sldId id="310" r:id="rId15"/>
+    <p:sldId id="301" r:id="rId16"/>
+    <p:sldId id="303" r:id="rId17"/>
+    <p:sldId id="302" r:id="rId18"/>
+    <p:sldId id="297" r:id="rId19"/>
+    <p:sldId id="299" r:id="rId20"/>
   </p:sldIdLst>
   <p:sldSz cx="9144000" cy="6858000" type="screen4x3"/>
   <p:notesSz cx="6858000" cy="9144000"/>
@@ -879,7 +881,7 @@
     </p:spTree>
     <p:extLst>
       <p:ext uri="{BB962C8B-B14F-4D97-AF65-F5344CB8AC3E}">
-        <p14:creationId xmlns:p14="http://schemas.microsoft.com/office/powerpoint/2010/main" val="2891194745"/>
+        <p14:creationId xmlns:p14="http://schemas.microsoft.com/office/powerpoint/2010/main" val="3095657656"/>
       </p:ext>
     </p:extLst>
   </p:cSld>
@@ -972,7 +974,7 @@
     </p:spTree>
     <p:extLst>
       <p:ext uri="{BB962C8B-B14F-4D97-AF65-F5344CB8AC3E}">
-        <p14:creationId xmlns:p14="http://schemas.microsoft.com/office/powerpoint/2010/main" val="1535124313"/>
+        <p14:creationId xmlns:p14="http://schemas.microsoft.com/office/powerpoint/2010/main" val="4170241719"/>
       </p:ext>
     </p:extLst>
   </p:cSld>
@@ -1065,7 +1067,7 @@
     </p:spTree>
     <p:extLst>
       <p:ext uri="{BB962C8B-B14F-4D97-AF65-F5344CB8AC3E}">
-        <p14:creationId xmlns:p14="http://schemas.microsoft.com/office/powerpoint/2010/main" val="2665212799"/>
+        <p14:creationId xmlns:p14="http://schemas.microsoft.com/office/powerpoint/2010/main" val="2891194745"/>
       </p:ext>
     </p:extLst>
   </p:cSld>
@@ -1158,7 +1160,7 @@
     </p:spTree>
     <p:extLst>
       <p:ext uri="{BB962C8B-B14F-4D97-AF65-F5344CB8AC3E}">
-        <p14:creationId xmlns:p14="http://schemas.microsoft.com/office/powerpoint/2010/main" val="4258458645"/>
+        <p14:creationId xmlns:p14="http://schemas.microsoft.com/office/powerpoint/2010/main" val="1535124313"/>
       </p:ext>
     </p:extLst>
   </p:cSld>
@@ -1243,6 +1245,192 @@
               <a:rPr lang="en-US" altLang="zh-CN" smtClean="0"/>
               <a:pPr/>
               <a:t>14</a:t>
+            </a:fld>
+            <a:endParaRPr lang="zh-CN" altLang="en-US"/>
+          </a:p>
+        </p:txBody>
+      </p:sp>
+    </p:spTree>
+    <p:extLst>
+      <p:ext uri="{BB962C8B-B14F-4D97-AF65-F5344CB8AC3E}">
+        <p14:creationId xmlns:p14="http://schemas.microsoft.com/office/powerpoint/2010/main" val="2665212799"/>
+      </p:ext>
+    </p:extLst>
+  </p:cSld>
+  <p:clrMapOvr>
+    <a:masterClrMapping/>
+  </p:clrMapOvr>
+</p:notes>
+</file>
+
+<file path=ppt/notesSlides/notesSlide15.xml><?xml version="1.0" encoding="utf-8"?>
+<p:notes xmlns:a="http://schemas.openxmlformats.org/drawingml/2006/main" xmlns:r="http://schemas.openxmlformats.org/officeDocument/2006/relationships" xmlns:p="http://schemas.openxmlformats.org/presentationml/2006/main">
+  <p:cSld>
+    <p:spTree>
+      <p:nvGrpSpPr>
+        <p:cNvPr id="1" name=""/>
+        <p:cNvGrpSpPr/>
+        <p:nvPr/>
+      </p:nvGrpSpPr>
+      <p:grpSpPr>
+        <a:xfrm>
+          <a:off x="0" y="0"/>
+          <a:ext cx="0" cy="0"/>
+          <a:chOff x="0" y="0"/>
+          <a:chExt cx="0" cy="0"/>
+        </a:xfrm>
+      </p:grpSpPr>
+      <p:sp>
+        <p:nvSpPr>
+          <p:cNvPr id="2" name="幻灯片图像占位符 1"/>
+          <p:cNvSpPr>
+            <a:spLocks noGrp="1" noRot="1" noChangeAspect="1"/>
+          </p:cNvSpPr>
+          <p:nvPr>
+            <p:ph type="sldImg"/>
+          </p:nvPr>
+        </p:nvSpPr>
+        <p:spPr>
+          <a:xfrm>
+            <a:off x="1371600" y="1143000"/>
+            <a:ext cx="4114800" cy="3086100"/>
+          </a:xfrm>
+        </p:spPr>
+      </p:sp>
+      <p:sp>
+        <p:nvSpPr>
+          <p:cNvPr id="3" name="备注占位符 2"/>
+          <p:cNvSpPr>
+            <a:spLocks noGrp="1"/>
+          </p:cNvSpPr>
+          <p:nvPr>
+            <p:ph type="body" idx="1"/>
+          </p:nvPr>
+        </p:nvSpPr>
+        <p:spPr/>
+        <p:txBody>
+          <a:bodyPr/>
+          <a:lstStyle/>
+          <a:p>
+            <a:endParaRPr lang="zh-CN" altLang="en-US" noProof="0" dirty="0">
+              <a:latin typeface="Microsoft YaHei UI" panose="020B0503020204020204" pitchFamily="34" charset="-122"/>
+              <a:ea typeface="Microsoft YaHei UI" panose="020B0503020204020204" pitchFamily="34" charset="-122"/>
+            </a:endParaRPr>
+          </a:p>
+        </p:txBody>
+      </p:sp>
+      <p:sp>
+        <p:nvSpPr>
+          <p:cNvPr id="4" name="灯片编号占位符 3"/>
+          <p:cNvSpPr>
+            <a:spLocks noGrp="1"/>
+          </p:cNvSpPr>
+          <p:nvPr>
+            <p:ph type="sldNum" sz="quarter" idx="5"/>
+          </p:nvPr>
+        </p:nvSpPr>
+        <p:spPr/>
+        <p:txBody>
+          <a:bodyPr/>
+          <a:lstStyle/>
+          <a:p>
+            <a:fld id="{DF61EA0F-A667-4B49-8422-0062BC55E249}" type="slidenum">
+              <a:rPr lang="en-US" altLang="zh-CN" smtClean="0"/>
+              <a:pPr/>
+              <a:t>15</a:t>
+            </a:fld>
+            <a:endParaRPr lang="zh-CN" altLang="en-US"/>
+          </a:p>
+        </p:txBody>
+      </p:sp>
+    </p:spTree>
+    <p:extLst>
+      <p:ext uri="{BB962C8B-B14F-4D97-AF65-F5344CB8AC3E}">
+        <p14:creationId xmlns:p14="http://schemas.microsoft.com/office/powerpoint/2010/main" val="4258458645"/>
+      </p:ext>
+    </p:extLst>
+  </p:cSld>
+  <p:clrMapOvr>
+    <a:masterClrMapping/>
+  </p:clrMapOvr>
+</p:notes>
+</file>
+
+<file path=ppt/notesSlides/notesSlide16.xml><?xml version="1.0" encoding="utf-8"?>
+<p:notes xmlns:a="http://schemas.openxmlformats.org/drawingml/2006/main" xmlns:r="http://schemas.openxmlformats.org/officeDocument/2006/relationships" xmlns:p="http://schemas.openxmlformats.org/presentationml/2006/main">
+  <p:cSld>
+    <p:spTree>
+      <p:nvGrpSpPr>
+        <p:cNvPr id="1" name=""/>
+        <p:cNvGrpSpPr/>
+        <p:nvPr/>
+      </p:nvGrpSpPr>
+      <p:grpSpPr>
+        <a:xfrm>
+          <a:off x="0" y="0"/>
+          <a:ext cx="0" cy="0"/>
+          <a:chOff x="0" y="0"/>
+          <a:chExt cx="0" cy="0"/>
+        </a:xfrm>
+      </p:grpSpPr>
+      <p:sp>
+        <p:nvSpPr>
+          <p:cNvPr id="2" name="幻灯片图像占位符 1"/>
+          <p:cNvSpPr>
+            <a:spLocks noGrp="1" noRot="1" noChangeAspect="1"/>
+          </p:cNvSpPr>
+          <p:nvPr>
+            <p:ph type="sldImg"/>
+          </p:nvPr>
+        </p:nvSpPr>
+        <p:spPr>
+          <a:xfrm>
+            <a:off x="1371600" y="1143000"/>
+            <a:ext cx="4114800" cy="3086100"/>
+          </a:xfrm>
+        </p:spPr>
+      </p:sp>
+      <p:sp>
+        <p:nvSpPr>
+          <p:cNvPr id="3" name="备注占位符 2"/>
+          <p:cNvSpPr>
+            <a:spLocks noGrp="1"/>
+          </p:cNvSpPr>
+          <p:nvPr>
+            <p:ph type="body" idx="1"/>
+          </p:nvPr>
+        </p:nvSpPr>
+        <p:spPr/>
+        <p:txBody>
+          <a:bodyPr/>
+          <a:lstStyle/>
+          <a:p>
+            <a:endParaRPr lang="zh-CN" altLang="en-US" noProof="0" dirty="0">
+              <a:latin typeface="Microsoft YaHei UI" panose="020B0503020204020204" pitchFamily="34" charset="-122"/>
+              <a:ea typeface="Microsoft YaHei UI" panose="020B0503020204020204" pitchFamily="34" charset="-122"/>
+            </a:endParaRPr>
+          </a:p>
+        </p:txBody>
+      </p:sp>
+      <p:sp>
+        <p:nvSpPr>
+          <p:cNvPr id="4" name="灯片编号占位符 3"/>
+          <p:cNvSpPr>
+            <a:spLocks noGrp="1"/>
+          </p:cNvSpPr>
+          <p:nvPr>
+            <p:ph type="sldNum" sz="quarter" idx="5"/>
+          </p:nvPr>
+        </p:nvSpPr>
+        <p:spPr/>
+        <p:txBody>
+          <a:bodyPr/>
+          <a:lstStyle/>
+          <a:p>
+            <a:fld id="{DF61EA0F-A667-4B49-8422-0062BC55E249}" type="slidenum">
+              <a:rPr lang="en-US" altLang="zh-CN" smtClean="0"/>
+              <a:pPr/>
+              <a:t>16</a:t>
             </a:fld>
             <a:endParaRPr lang="zh-CN" altLang="en-US"/>
           </a:p>
@@ -1995,7 +2183,7 @@
     </p:spTree>
     <p:extLst>
       <p:ext uri="{BB962C8B-B14F-4D97-AF65-F5344CB8AC3E}">
-        <p14:creationId xmlns:p14="http://schemas.microsoft.com/office/powerpoint/2010/main" val="702657693"/>
+        <p14:creationId xmlns:p14="http://schemas.microsoft.com/office/powerpoint/2010/main" val="2205684901"/>
       </p:ext>
     </p:extLst>
   </p:cSld>
@@ -3989,7 +4177,7 @@
         <p:spPr>
           <a:xfrm>
             <a:off x="351020" y="1367235"/>
-            <a:ext cx="8386771" cy="4189993"/>
+            <a:ext cx="8386771" cy="496674"/>
           </a:xfrm>
           <a:prstGeom prst="rect">
             <a:avLst/>
@@ -4015,156 +4203,84 @@
               <a:rPr lang="en-US" altLang="zh-CN" sz="2000" b="1" dirty="0">
                 <a:latin typeface="Segoe UI (Textkörper)"/>
               </a:rPr>
-              <a:t>Data processing:</a:t>
-            </a:r>
-          </a:p>
-          <a:p>
-            <a:pPr marL="800100" lvl="1" indent="-342900">
-              <a:lnSpc>
-                <a:spcPct val="150000"/>
-              </a:lnSpc>
-              <a:buClr>
-                <a:srgbClr val="0070C0"/>
-              </a:buClr>
-              <a:buFont typeface="Arial" panose="020B0604020202020204" pitchFamily="34" charset="0"/>
-              <a:buChar char="•"/>
-            </a:pPr>
-            <a:r>
-              <a:rPr lang="en-US" altLang="zh-CN" sz="2000" dirty="0">
+              <a:t>Model: </a:t>
+            </a:r>
+            <a:r>
+              <a:rPr lang="en-US" altLang="zh-CN" sz="2000" dirty="0" err="1">
                 <a:latin typeface="Segoe UI (Textkörper)"/>
               </a:rPr>
-              <a:t>Load the data (images with annotations)</a:t>
-            </a:r>
-          </a:p>
-          <a:p>
-            <a:pPr marL="800100" lvl="1" indent="-342900">
-              <a:lnSpc>
-                <a:spcPct val="150000"/>
-              </a:lnSpc>
-              <a:buClr>
-                <a:srgbClr val="0070C0"/>
-              </a:buClr>
-              <a:buFont typeface="Arial" panose="020B0604020202020204" pitchFamily="34" charset="0"/>
-              <a:buChar char="•"/>
-            </a:pPr>
-            <a:r>
-              <a:rPr lang="en-US" altLang="zh-CN" sz="2000" dirty="0">
-                <a:latin typeface="Segoe UI (Textkörper)"/>
-              </a:rPr>
-              <a:t>Augment the data:</a:t>
-            </a:r>
-          </a:p>
-          <a:p>
-            <a:pPr marL="1257300" lvl="2" indent="-342900">
-              <a:lnSpc>
-                <a:spcPct val="150000"/>
-              </a:lnSpc>
-              <a:buClr>
-                <a:srgbClr val="0070C0"/>
-              </a:buClr>
-              <a:buFont typeface="Arial" panose="020B0604020202020204" pitchFamily="34" charset="0"/>
-              <a:buChar char="•"/>
-            </a:pPr>
-            <a:r>
-              <a:rPr lang="en-US" altLang="zh-CN" sz="2000" dirty="0">
-                <a:latin typeface="Segoe UI (Textkörper)"/>
-              </a:rPr>
-              <a:t>Uniform size of 299x299 resolution</a:t>
-            </a:r>
-          </a:p>
-          <a:p>
-            <a:pPr marL="1257300" lvl="2" indent="-342900">
-              <a:lnSpc>
-                <a:spcPct val="150000"/>
-              </a:lnSpc>
-              <a:buClr>
-                <a:srgbClr val="0070C0"/>
-              </a:buClr>
-              <a:buFont typeface="Arial" panose="020B0604020202020204" pitchFamily="34" charset="0"/>
-              <a:buChar char="•"/>
-            </a:pPr>
-            <a:r>
-              <a:rPr lang="en-US" altLang="zh-CN" sz="2000" dirty="0">
-                <a:latin typeface="Segoe UI (Textkörper)"/>
-              </a:rPr>
-              <a:t>For color: brightness, contrast, saturation, hue modifications</a:t>
-            </a:r>
-          </a:p>
-          <a:p>
-            <a:pPr marL="1257300" lvl="2" indent="-342900">
-              <a:lnSpc>
-                <a:spcPct val="150000"/>
-              </a:lnSpc>
-              <a:buClr>
-                <a:srgbClr val="0070C0"/>
-              </a:buClr>
-              <a:buFont typeface="Arial" panose="020B0604020202020204" pitchFamily="34" charset="0"/>
-              <a:buChar char="•"/>
-            </a:pPr>
-            <a:r>
-              <a:rPr lang="en-US" altLang="zh-CN" sz="2000" dirty="0">
-                <a:latin typeface="Segoe UI (Textkörper)"/>
-              </a:rPr>
-              <a:t>For image: Scaling, flipping, center crop</a:t>
-            </a:r>
-          </a:p>
-          <a:p>
-            <a:pPr marL="1257300" lvl="2" indent="-342900">
-              <a:lnSpc>
-                <a:spcPct val="150000"/>
-              </a:lnSpc>
-              <a:buClr>
-                <a:srgbClr val="0070C0"/>
-              </a:buClr>
-              <a:buFont typeface="Arial" panose="020B0604020202020204" pitchFamily="34" charset="0"/>
-              <a:buChar char="•"/>
-            </a:pPr>
+              <a:t>MnasNet</a:t>
+            </a:r>
             <a:endParaRPr lang="en-US" altLang="zh-CN" sz="2000" dirty="0">
               <a:latin typeface="Segoe UI (Textkörper)"/>
             </a:endParaRPr>
           </a:p>
-          <a:p>
-            <a:pPr marL="342900" indent="-342900">
-              <a:lnSpc>
-                <a:spcPct val="150000"/>
-              </a:lnSpc>
-              <a:buClr>
-                <a:srgbClr val="0070C0"/>
-              </a:buClr>
-              <a:buFont typeface="Arial" panose="020B0604020202020204" pitchFamily="34" charset="0"/>
-              <a:buChar char="•"/>
-            </a:pPr>
-            <a:r>
-              <a:rPr lang="en-US" altLang="zh-CN" sz="2000" b="1" dirty="0">
-                <a:latin typeface="Segoe UI (Textkörper)"/>
-              </a:rPr>
-              <a:t>Training:</a:t>
-            </a:r>
-          </a:p>
-          <a:p>
-            <a:pPr marL="800100" lvl="1" indent="-342900">
-              <a:lnSpc>
-                <a:spcPct val="150000"/>
-              </a:lnSpc>
-              <a:buClr>
-                <a:srgbClr val="0070C0"/>
-              </a:buClr>
-              <a:buFont typeface="Arial" panose="020B0604020202020204" pitchFamily="34" charset="0"/>
-              <a:buChar char="•"/>
-            </a:pPr>
-            <a:r>
-              <a:rPr lang="en-US" altLang="zh-CN" sz="2000" dirty="0">
-                <a:latin typeface="Segoe UI (Textkörper)"/>
-              </a:rPr>
-              <a:t>Tune hyperparameters, epochs and batch sizes</a:t>
-            </a:r>
-          </a:p>
         </p:txBody>
       </p:sp>
+      <p:pic>
+        <p:nvPicPr>
+          <p:cNvPr id="4" name="图片 3">
+            <a:extLst>
+              <a:ext uri="{FF2B5EF4-FFF2-40B4-BE49-F238E27FC236}">
+                <a16:creationId xmlns:a16="http://schemas.microsoft.com/office/drawing/2014/main" id="{52D17E55-503B-48CE-92C4-AFC42ECB9700}"/>
+              </a:ext>
+            </a:extLst>
+          </p:cNvPr>
+          <p:cNvPicPr>
+            <a:picLocks noChangeAspect="1"/>
+          </p:cNvPicPr>
+          <p:nvPr/>
+        </p:nvPicPr>
+        <p:blipFill>
+          <a:blip r:embed="rId3"/>
+          <a:stretch>
+            <a:fillRect/>
+          </a:stretch>
+        </p:blipFill>
+        <p:spPr>
+          <a:xfrm>
+            <a:off x="893421" y="2000781"/>
+            <a:ext cx="3048264" cy="3993226"/>
+          </a:xfrm>
+          <a:prstGeom prst="rect">
+            <a:avLst/>
+          </a:prstGeom>
+        </p:spPr>
+      </p:pic>
+      <p:pic>
+        <p:nvPicPr>
+          <p:cNvPr id="5" name="图片 4">
+            <a:extLst>
+              <a:ext uri="{FF2B5EF4-FFF2-40B4-BE49-F238E27FC236}">
+                <a16:creationId xmlns:a16="http://schemas.microsoft.com/office/drawing/2014/main" id="{8FB64B0D-93F1-4093-B8EF-65691893F098}"/>
+              </a:ext>
+            </a:extLst>
+          </p:cNvPr>
+          <p:cNvPicPr>
+            <a:picLocks noChangeAspect="1"/>
+          </p:cNvPicPr>
+          <p:nvPr/>
+        </p:nvPicPr>
+        <p:blipFill>
+          <a:blip r:embed="rId4"/>
+          <a:stretch>
+            <a:fillRect/>
+          </a:stretch>
+        </p:blipFill>
+        <p:spPr>
+          <a:xfrm>
+            <a:off x="4037044" y="2935895"/>
+            <a:ext cx="4872743" cy="1769270"/>
+          </a:xfrm>
+          <a:prstGeom prst="rect">
+            <a:avLst/>
+          </a:prstGeom>
+        </p:spPr>
+      </p:pic>
     </p:spTree>
     <p:extLst>
       <p:ext uri="{BB962C8B-B14F-4D97-AF65-F5344CB8AC3E}">
-        <p14:creationId xmlns:p14="http://schemas.microsoft.com/office/powerpoint/2010/main" val="2095750614"/>
+        <p14:creationId xmlns:p14="http://schemas.microsoft.com/office/powerpoint/2010/main" val="689391963"/>
       </p:ext>
     </p:extLst>
   </p:cSld>
@@ -4218,6 +4334,897 @@
           <a:p>
             <a:r>
               <a:rPr lang="en-US" altLang="zh-CN" b="1" dirty="0"/>
+              <a:t>Proposed Approach</a:t>
+            </a:r>
+            <a:endParaRPr lang="zh-CN" altLang="en-US" dirty="0">
+              <a:cs typeface="Segoe UI Light" panose="020B0502040204020203" pitchFamily="34" charset="0"/>
+            </a:endParaRPr>
+          </a:p>
+        </p:txBody>
+      </p:sp>
+      <p:sp>
+        <p:nvSpPr>
+          <p:cNvPr id="38" name="内容占位符 17"/>
+          <p:cNvSpPr txBox="1">
+            <a:spLocks/>
+          </p:cNvSpPr>
+          <p:nvPr/>
+        </p:nvSpPr>
+        <p:spPr>
+          <a:xfrm>
+            <a:off x="406208" y="2000781"/>
+            <a:ext cx="3241278" cy="2903639"/>
+          </a:xfrm>
+          <a:prstGeom prst="rect">
+            <a:avLst/>
+          </a:prstGeom>
+        </p:spPr>
+        <p:txBody>
+          <a:bodyPr vert="horz" lIns="68580" tIns="34290" rIns="68580" bIns="34290" rtlCol="0">
+            <a:normAutofit/>
+          </a:bodyPr>
+          <a:lstStyle>
+            <a:lvl1pPr marL="228600" indent="-228600" algn="l" defTabSz="914400" rtl="0" eaLnBrk="1" latinLnBrk="0" hangingPunct="1">
+              <a:lnSpc>
+                <a:spcPts val="1800"/>
+              </a:lnSpc>
+              <a:spcBef>
+                <a:spcPts val="1000"/>
+              </a:spcBef>
+              <a:spcAft>
+                <a:spcPts val="1000"/>
+              </a:spcAft>
+              <a:buFont typeface="Arial" panose="020B0604020202020204" pitchFamily="34" charset="0"/>
+              <a:buChar char="•"/>
+              <a:defRPr lang="en-US" sz="1200" kern="1200" smtClean="0">
+                <a:solidFill>
+                  <a:schemeClr val="tx1">
+                    <a:lumMod val="75000"/>
+                    <a:lumOff val="25000"/>
+                  </a:schemeClr>
+                </a:solidFill>
+                <a:latin typeface="+mn-lt"/>
+                <a:ea typeface="+mn-ea"/>
+                <a:cs typeface="+mn-cs"/>
+              </a:defRPr>
+            </a:lvl1pPr>
+            <a:lvl2pPr marL="685800" indent="-228600" algn="l" defTabSz="914400" rtl="0" eaLnBrk="1" latinLnBrk="0" hangingPunct="1">
+              <a:lnSpc>
+                <a:spcPts val="1800"/>
+              </a:lnSpc>
+              <a:spcBef>
+                <a:spcPts val="1000"/>
+              </a:spcBef>
+              <a:spcAft>
+                <a:spcPts val="1000"/>
+              </a:spcAft>
+              <a:buFont typeface="Arial" panose="020B0604020202020204" pitchFamily="34" charset="0"/>
+              <a:buChar char="•"/>
+              <a:defRPr lang="en-US" sz="1200" kern="1200" smtClean="0">
+                <a:solidFill>
+                  <a:schemeClr val="tx1">
+                    <a:lumMod val="75000"/>
+                    <a:lumOff val="25000"/>
+                  </a:schemeClr>
+                </a:solidFill>
+                <a:latin typeface="+mn-lt"/>
+                <a:ea typeface="+mn-ea"/>
+                <a:cs typeface="+mn-cs"/>
+              </a:defRPr>
+            </a:lvl2pPr>
+            <a:lvl3pPr marL="1143000" indent="-228600" algn="l" defTabSz="914400" rtl="0" eaLnBrk="1" latinLnBrk="0" hangingPunct="1">
+              <a:lnSpc>
+                <a:spcPts val="1800"/>
+              </a:lnSpc>
+              <a:spcBef>
+                <a:spcPts val="1000"/>
+              </a:spcBef>
+              <a:spcAft>
+                <a:spcPts val="1000"/>
+              </a:spcAft>
+              <a:buFont typeface="Arial" panose="020B0604020202020204" pitchFamily="34" charset="0"/>
+              <a:buChar char="•"/>
+              <a:defRPr lang="en-US" sz="1200" kern="1200" smtClean="0">
+                <a:solidFill>
+                  <a:schemeClr val="tx1">
+                    <a:lumMod val="75000"/>
+                    <a:lumOff val="25000"/>
+                  </a:schemeClr>
+                </a:solidFill>
+                <a:latin typeface="+mn-lt"/>
+                <a:ea typeface="+mn-ea"/>
+                <a:cs typeface="+mn-cs"/>
+              </a:defRPr>
+            </a:lvl3pPr>
+            <a:lvl4pPr marL="1600200" indent="-228600" algn="l" defTabSz="914400" rtl="0" eaLnBrk="1" latinLnBrk="0" hangingPunct="1">
+              <a:lnSpc>
+                <a:spcPts val="1800"/>
+              </a:lnSpc>
+              <a:spcBef>
+                <a:spcPts val="1000"/>
+              </a:spcBef>
+              <a:spcAft>
+                <a:spcPts val="1000"/>
+              </a:spcAft>
+              <a:buFont typeface="Arial" panose="020B0604020202020204" pitchFamily="34" charset="0"/>
+              <a:buChar char="•"/>
+              <a:defRPr lang="en-US" sz="1200" kern="1200" smtClean="0">
+                <a:solidFill>
+                  <a:schemeClr val="tx1">
+                    <a:lumMod val="75000"/>
+                    <a:lumOff val="25000"/>
+                  </a:schemeClr>
+                </a:solidFill>
+                <a:latin typeface="+mn-lt"/>
+                <a:ea typeface="+mn-ea"/>
+                <a:cs typeface="+mn-cs"/>
+              </a:defRPr>
+            </a:lvl4pPr>
+            <a:lvl5pPr marL="2057400" indent="-228600" algn="l" defTabSz="914400" rtl="0" eaLnBrk="1" latinLnBrk="0" hangingPunct="1">
+              <a:lnSpc>
+                <a:spcPts val="1800"/>
+              </a:lnSpc>
+              <a:spcBef>
+                <a:spcPts val="1000"/>
+              </a:spcBef>
+              <a:spcAft>
+                <a:spcPts val="1000"/>
+              </a:spcAft>
+              <a:buFont typeface="Arial" panose="020B0604020202020204" pitchFamily="34" charset="0"/>
+              <a:buChar char="•"/>
+              <a:defRPr lang="en-US" sz="1200" kern="1200">
+                <a:solidFill>
+                  <a:schemeClr val="tx1">
+                    <a:lumMod val="75000"/>
+                    <a:lumOff val="25000"/>
+                  </a:schemeClr>
+                </a:solidFill>
+                <a:latin typeface="+mn-lt"/>
+                <a:ea typeface="+mn-ea"/>
+                <a:cs typeface="+mn-cs"/>
+              </a:defRPr>
+            </a:lvl5pPr>
+            <a:lvl6pPr marL="2514600" indent="-228600" algn="l" defTabSz="914400" rtl="0" eaLnBrk="1" latinLnBrk="0" hangingPunct="1">
+              <a:lnSpc>
+                <a:spcPct val="90000"/>
+              </a:lnSpc>
+              <a:spcBef>
+                <a:spcPct val="30000"/>
+              </a:spcBef>
+              <a:buFont typeface="Arial" panose="020B0604020202020204" pitchFamily="34" charset="0"/>
+              <a:buChar char="•"/>
+              <a:defRPr sz="1800" kern="1200">
+                <a:solidFill>
+                  <a:schemeClr val="tx1"/>
+                </a:solidFill>
+                <a:latin typeface="+mn-lt"/>
+                <a:ea typeface="+mn-ea"/>
+                <a:cs typeface="+mn-cs"/>
+              </a:defRPr>
+            </a:lvl6pPr>
+            <a:lvl7pPr marL="2971800" indent="-228600" algn="l" defTabSz="914400" rtl="0" eaLnBrk="1" latinLnBrk="0" hangingPunct="1">
+              <a:lnSpc>
+                <a:spcPct val="90000"/>
+              </a:lnSpc>
+              <a:spcBef>
+                <a:spcPct val="30000"/>
+              </a:spcBef>
+              <a:buFont typeface="Arial" panose="020B0604020202020204" pitchFamily="34" charset="0"/>
+              <a:buChar char="•"/>
+              <a:defRPr sz="1800" kern="1200">
+                <a:solidFill>
+                  <a:schemeClr val="tx1"/>
+                </a:solidFill>
+                <a:latin typeface="+mn-lt"/>
+                <a:ea typeface="+mn-ea"/>
+                <a:cs typeface="+mn-cs"/>
+              </a:defRPr>
+            </a:lvl7pPr>
+            <a:lvl8pPr marL="3429000" indent="-228600" algn="l" defTabSz="914400" rtl="0" eaLnBrk="1" latinLnBrk="0" hangingPunct="1">
+              <a:lnSpc>
+                <a:spcPct val="90000"/>
+              </a:lnSpc>
+              <a:spcBef>
+                <a:spcPct val="30000"/>
+              </a:spcBef>
+              <a:buFont typeface="Arial" panose="020B0604020202020204" pitchFamily="34" charset="0"/>
+              <a:buChar char="•"/>
+              <a:defRPr sz="1800" kern="1200">
+                <a:solidFill>
+                  <a:schemeClr val="tx1"/>
+                </a:solidFill>
+                <a:latin typeface="+mn-lt"/>
+                <a:ea typeface="+mn-ea"/>
+                <a:cs typeface="+mn-cs"/>
+              </a:defRPr>
+            </a:lvl8pPr>
+            <a:lvl9pPr marL="3886200" indent="-228600" algn="l" defTabSz="914400" rtl="0" eaLnBrk="1" latinLnBrk="0" hangingPunct="1">
+              <a:lnSpc>
+                <a:spcPct val="90000"/>
+              </a:lnSpc>
+              <a:spcBef>
+                <a:spcPct val="30000"/>
+              </a:spcBef>
+              <a:buFont typeface="Arial" panose="020B0604020202020204" pitchFamily="34" charset="0"/>
+              <a:buChar char="•"/>
+              <a:defRPr sz="1800" kern="1200">
+                <a:solidFill>
+                  <a:schemeClr val="tx1"/>
+                </a:solidFill>
+                <a:latin typeface="+mn-lt"/>
+                <a:ea typeface="+mn-ea"/>
+                <a:cs typeface="+mn-cs"/>
+              </a:defRPr>
+            </a:lvl9pPr>
+          </a:lstStyle>
+          <a:p>
+            <a:pPr marL="0" indent="0">
+              <a:spcAft>
+                <a:spcPts val="450"/>
+              </a:spcAft>
+              <a:buNone/>
+              <a:defRPr/>
+            </a:pPr>
+            <a:endParaRPr lang="zh-CN" altLang="en-US" sz="900" dirty="0">
+              <a:latin typeface="Microsoft YaHei UI" panose="020B0503020204020204" pitchFamily="34" charset="-122"/>
+              <a:ea typeface="Microsoft YaHei UI" panose="020B0503020204020204" pitchFamily="34" charset="-122"/>
+              <a:cs typeface="Segoe UI" panose="020B0502040204020203" pitchFamily="34" charset="0"/>
+            </a:endParaRPr>
+          </a:p>
+        </p:txBody>
+      </p:sp>
+      <p:sp>
+        <p:nvSpPr>
+          <p:cNvPr id="2" name="矩形 1">
+            <a:extLst>
+              <a:ext uri="{FF2B5EF4-FFF2-40B4-BE49-F238E27FC236}">
+                <a16:creationId xmlns:a16="http://schemas.microsoft.com/office/drawing/2014/main" id="{61913634-122C-430D-BE79-95FE908A90D7}"/>
+              </a:ext>
+            </a:extLst>
+          </p:cNvPr>
+          <p:cNvSpPr/>
+          <p:nvPr/>
+        </p:nvSpPr>
+        <p:spPr>
+          <a:xfrm>
+            <a:off x="351020" y="1367235"/>
+            <a:ext cx="8386771" cy="496674"/>
+          </a:xfrm>
+          <a:prstGeom prst="rect">
+            <a:avLst/>
+          </a:prstGeom>
+        </p:spPr>
+        <p:txBody>
+          <a:bodyPr wrap="square">
+            <a:spAutoFit/>
+          </a:bodyPr>
+          <a:lstStyle/>
+          <a:p>
+            <a:pPr marL="342900" indent="-342900">
+              <a:lnSpc>
+                <a:spcPct val="150000"/>
+              </a:lnSpc>
+              <a:buClr>
+                <a:srgbClr val="0070C0"/>
+              </a:buClr>
+              <a:buFont typeface="Arial" panose="020B0604020202020204" pitchFamily="34" charset="0"/>
+              <a:buChar char="•"/>
+            </a:pPr>
+            <a:r>
+              <a:rPr lang="en-US" altLang="zh-CN" sz="2000" b="1" dirty="0">
+                <a:latin typeface="Segoe UI (Textkörper)"/>
+              </a:rPr>
+              <a:t>Model: </a:t>
+            </a:r>
+            <a:r>
+              <a:rPr lang="en-US" altLang="zh-CN" sz="2000" dirty="0">
+                <a:latin typeface="Segoe UI (Textkörper)"/>
+              </a:rPr>
+              <a:t>Inception-v3</a:t>
+            </a:r>
+          </a:p>
+        </p:txBody>
+      </p:sp>
+      <p:pic>
+        <p:nvPicPr>
+          <p:cNvPr id="3" name="图片 2">
+            <a:extLst>
+              <a:ext uri="{FF2B5EF4-FFF2-40B4-BE49-F238E27FC236}">
+                <a16:creationId xmlns:a16="http://schemas.microsoft.com/office/drawing/2014/main" id="{A0F9D3DD-5361-4FF8-9CE8-6414E5E0777F}"/>
+              </a:ext>
+            </a:extLst>
+          </p:cNvPr>
+          <p:cNvPicPr>
+            <a:picLocks noChangeAspect="1"/>
+          </p:cNvPicPr>
+          <p:nvPr/>
+        </p:nvPicPr>
+        <p:blipFill>
+          <a:blip r:embed="rId3"/>
+          <a:stretch>
+            <a:fillRect/>
+          </a:stretch>
+        </p:blipFill>
+        <p:spPr>
+          <a:xfrm>
+            <a:off x="640291" y="1863909"/>
+            <a:ext cx="3229511" cy="4314949"/>
+          </a:xfrm>
+          <a:prstGeom prst="rect">
+            <a:avLst/>
+          </a:prstGeom>
+        </p:spPr>
+      </p:pic>
+      <p:pic>
+        <p:nvPicPr>
+          <p:cNvPr id="6" name="图片 5">
+            <a:extLst>
+              <a:ext uri="{FF2B5EF4-FFF2-40B4-BE49-F238E27FC236}">
+                <a16:creationId xmlns:a16="http://schemas.microsoft.com/office/drawing/2014/main" id="{516713FA-0735-49DC-96B9-787BD1A47135}"/>
+              </a:ext>
+            </a:extLst>
+          </p:cNvPr>
+          <p:cNvPicPr>
+            <a:picLocks noChangeAspect="1"/>
+          </p:cNvPicPr>
+          <p:nvPr/>
+        </p:nvPicPr>
+        <p:blipFill>
+          <a:blip r:embed="rId4"/>
+          <a:stretch>
+            <a:fillRect/>
+          </a:stretch>
+        </p:blipFill>
+        <p:spPr>
+          <a:xfrm>
+            <a:off x="3277240" y="3000477"/>
+            <a:ext cx="5608482" cy="904246"/>
+          </a:xfrm>
+          <a:prstGeom prst="rect">
+            <a:avLst/>
+          </a:prstGeom>
+        </p:spPr>
+      </p:pic>
+    </p:spTree>
+    <p:extLst>
+      <p:ext uri="{BB962C8B-B14F-4D97-AF65-F5344CB8AC3E}">
+        <p14:creationId xmlns:p14="http://schemas.microsoft.com/office/powerpoint/2010/main" val="2242910558"/>
+      </p:ext>
+    </p:extLst>
+  </p:cSld>
+  <p:clrMapOvr>
+    <a:masterClrMapping/>
+  </p:clrMapOvr>
+  <mc:AlternateContent xmlns:mc="http://schemas.openxmlformats.org/markup-compatibility/2006" xmlns:p14="http://schemas.microsoft.com/office/powerpoint/2010/main">
+    <mc:Choice Requires="p14">
+      <p:transition p14:dur="10"/>
+    </mc:Choice>
+    <mc:Fallback xmlns="">
+      <p:transition/>
+    </mc:Fallback>
+  </mc:AlternateContent>
+</p:sld>
+</file>
+
+<file path=ppt/slides/slide12.xml><?xml version="1.0" encoding="utf-8"?>
+<p:sld xmlns:a="http://schemas.openxmlformats.org/drawingml/2006/main" xmlns:r="http://schemas.openxmlformats.org/officeDocument/2006/relationships" xmlns:p="http://schemas.openxmlformats.org/presentationml/2006/main">
+  <p:cSld>
+    <p:spTree>
+      <p:nvGrpSpPr>
+        <p:cNvPr id="1" name=""/>
+        <p:cNvGrpSpPr/>
+        <p:nvPr/>
+      </p:nvGrpSpPr>
+      <p:grpSpPr>
+        <a:xfrm>
+          <a:off x="0" y="0"/>
+          <a:ext cx="0" cy="0"/>
+          <a:chOff x="0" y="0"/>
+          <a:chExt cx="0" cy="0"/>
+        </a:xfrm>
+      </p:grpSpPr>
+      <p:sp>
+        <p:nvSpPr>
+          <p:cNvPr id="8" name="标题 7"/>
+          <p:cNvSpPr>
+            <a:spLocks noGrp="1"/>
+          </p:cNvSpPr>
+          <p:nvPr>
+            <p:ph type="title"/>
+          </p:nvPr>
+        </p:nvSpPr>
+        <p:spPr/>
+        <p:txBody>
+          <a:bodyPr rtlCol="0">
+            <a:noAutofit/>
+          </a:bodyPr>
+          <a:lstStyle/>
+          <a:p>
+            <a:r>
+              <a:rPr lang="en-US" altLang="zh-CN" b="1" dirty="0"/>
+              <a:t>Proposed Approach</a:t>
+            </a:r>
+            <a:endParaRPr lang="zh-CN" altLang="en-US" dirty="0">
+              <a:cs typeface="Segoe UI Light" panose="020B0502040204020203" pitchFamily="34" charset="0"/>
+            </a:endParaRPr>
+          </a:p>
+        </p:txBody>
+      </p:sp>
+      <p:sp>
+        <p:nvSpPr>
+          <p:cNvPr id="38" name="内容占位符 17"/>
+          <p:cNvSpPr txBox="1">
+            <a:spLocks/>
+          </p:cNvSpPr>
+          <p:nvPr/>
+        </p:nvSpPr>
+        <p:spPr>
+          <a:xfrm>
+            <a:off x="406208" y="2000781"/>
+            <a:ext cx="3241278" cy="2903639"/>
+          </a:xfrm>
+          <a:prstGeom prst="rect">
+            <a:avLst/>
+          </a:prstGeom>
+        </p:spPr>
+        <p:txBody>
+          <a:bodyPr vert="horz" lIns="68580" tIns="34290" rIns="68580" bIns="34290" rtlCol="0">
+            <a:normAutofit/>
+          </a:bodyPr>
+          <a:lstStyle>
+            <a:lvl1pPr marL="228600" indent="-228600" algn="l" defTabSz="914400" rtl="0" eaLnBrk="1" latinLnBrk="0" hangingPunct="1">
+              <a:lnSpc>
+                <a:spcPts val="1800"/>
+              </a:lnSpc>
+              <a:spcBef>
+                <a:spcPts val="1000"/>
+              </a:spcBef>
+              <a:spcAft>
+                <a:spcPts val="1000"/>
+              </a:spcAft>
+              <a:buFont typeface="Arial" panose="020B0604020202020204" pitchFamily="34" charset="0"/>
+              <a:buChar char="•"/>
+              <a:defRPr lang="en-US" sz="1200" kern="1200" smtClean="0">
+                <a:solidFill>
+                  <a:schemeClr val="tx1">
+                    <a:lumMod val="75000"/>
+                    <a:lumOff val="25000"/>
+                  </a:schemeClr>
+                </a:solidFill>
+                <a:latin typeface="+mn-lt"/>
+                <a:ea typeface="+mn-ea"/>
+                <a:cs typeface="+mn-cs"/>
+              </a:defRPr>
+            </a:lvl1pPr>
+            <a:lvl2pPr marL="685800" indent="-228600" algn="l" defTabSz="914400" rtl="0" eaLnBrk="1" latinLnBrk="0" hangingPunct="1">
+              <a:lnSpc>
+                <a:spcPts val="1800"/>
+              </a:lnSpc>
+              <a:spcBef>
+                <a:spcPts val="1000"/>
+              </a:spcBef>
+              <a:spcAft>
+                <a:spcPts val="1000"/>
+              </a:spcAft>
+              <a:buFont typeface="Arial" panose="020B0604020202020204" pitchFamily="34" charset="0"/>
+              <a:buChar char="•"/>
+              <a:defRPr lang="en-US" sz="1200" kern="1200" smtClean="0">
+                <a:solidFill>
+                  <a:schemeClr val="tx1">
+                    <a:lumMod val="75000"/>
+                    <a:lumOff val="25000"/>
+                  </a:schemeClr>
+                </a:solidFill>
+                <a:latin typeface="+mn-lt"/>
+                <a:ea typeface="+mn-ea"/>
+                <a:cs typeface="+mn-cs"/>
+              </a:defRPr>
+            </a:lvl2pPr>
+            <a:lvl3pPr marL="1143000" indent="-228600" algn="l" defTabSz="914400" rtl="0" eaLnBrk="1" latinLnBrk="0" hangingPunct="1">
+              <a:lnSpc>
+                <a:spcPts val="1800"/>
+              </a:lnSpc>
+              <a:spcBef>
+                <a:spcPts val="1000"/>
+              </a:spcBef>
+              <a:spcAft>
+                <a:spcPts val="1000"/>
+              </a:spcAft>
+              <a:buFont typeface="Arial" panose="020B0604020202020204" pitchFamily="34" charset="0"/>
+              <a:buChar char="•"/>
+              <a:defRPr lang="en-US" sz="1200" kern="1200" smtClean="0">
+                <a:solidFill>
+                  <a:schemeClr val="tx1">
+                    <a:lumMod val="75000"/>
+                    <a:lumOff val="25000"/>
+                  </a:schemeClr>
+                </a:solidFill>
+                <a:latin typeface="+mn-lt"/>
+                <a:ea typeface="+mn-ea"/>
+                <a:cs typeface="+mn-cs"/>
+              </a:defRPr>
+            </a:lvl3pPr>
+            <a:lvl4pPr marL="1600200" indent="-228600" algn="l" defTabSz="914400" rtl="0" eaLnBrk="1" latinLnBrk="0" hangingPunct="1">
+              <a:lnSpc>
+                <a:spcPts val="1800"/>
+              </a:lnSpc>
+              <a:spcBef>
+                <a:spcPts val="1000"/>
+              </a:spcBef>
+              <a:spcAft>
+                <a:spcPts val="1000"/>
+              </a:spcAft>
+              <a:buFont typeface="Arial" panose="020B0604020202020204" pitchFamily="34" charset="0"/>
+              <a:buChar char="•"/>
+              <a:defRPr lang="en-US" sz="1200" kern="1200" smtClean="0">
+                <a:solidFill>
+                  <a:schemeClr val="tx1">
+                    <a:lumMod val="75000"/>
+                    <a:lumOff val="25000"/>
+                  </a:schemeClr>
+                </a:solidFill>
+                <a:latin typeface="+mn-lt"/>
+                <a:ea typeface="+mn-ea"/>
+                <a:cs typeface="+mn-cs"/>
+              </a:defRPr>
+            </a:lvl4pPr>
+            <a:lvl5pPr marL="2057400" indent="-228600" algn="l" defTabSz="914400" rtl="0" eaLnBrk="1" latinLnBrk="0" hangingPunct="1">
+              <a:lnSpc>
+                <a:spcPts val="1800"/>
+              </a:lnSpc>
+              <a:spcBef>
+                <a:spcPts val="1000"/>
+              </a:spcBef>
+              <a:spcAft>
+                <a:spcPts val="1000"/>
+              </a:spcAft>
+              <a:buFont typeface="Arial" panose="020B0604020202020204" pitchFamily="34" charset="0"/>
+              <a:buChar char="•"/>
+              <a:defRPr lang="en-US" sz="1200" kern="1200">
+                <a:solidFill>
+                  <a:schemeClr val="tx1">
+                    <a:lumMod val="75000"/>
+                    <a:lumOff val="25000"/>
+                  </a:schemeClr>
+                </a:solidFill>
+                <a:latin typeface="+mn-lt"/>
+                <a:ea typeface="+mn-ea"/>
+                <a:cs typeface="+mn-cs"/>
+              </a:defRPr>
+            </a:lvl5pPr>
+            <a:lvl6pPr marL="2514600" indent="-228600" algn="l" defTabSz="914400" rtl="0" eaLnBrk="1" latinLnBrk="0" hangingPunct="1">
+              <a:lnSpc>
+                <a:spcPct val="90000"/>
+              </a:lnSpc>
+              <a:spcBef>
+                <a:spcPct val="30000"/>
+              </a:spcBef>
+              <a:buFont typeface="Arial" panose="020B0604020202020204" pitchFamily="34" charset="0"/>
+              <a:buChar char="•"/>
+              <a:defRPr sz="1800" kern="1200">
+                <a:solidFill>
+                  <a:schemeClr val="tx1"/>
+                </a:solidFill>
+                <a:latin typeface="+mn-lt"/>
+                <a:ea typeface="+mn-ea"/>
+                <a:cs typeface="+mn-cs"/>
+              </a:defRPr>
+            </a:lvl6pPr>
+            <a:lvl7pPr marL="2971800" indent="-228600" algn="l" defTabSz="914400" rtl="0" eaLnBrk="1" latinLnBrk="0" hangingPunct="1">
+              <a:lnSpc>
+                <a:spcPct val="90000"/>
+              </a:lnSpc>
+              <a:spcBef>
+                <a:spcPct val="30000"/>
+              </a:spcBef>
+              <a:buFont typeface="Arial" panose="020B0604020202020204" pitchFamily="34" charset="0"/>
+              <a:buChar char="•"/>
+              <a:defRPr sz="1800" kern="1200">
+                <a:solidFill>
+                  <a:schemeClr val="tx1"/>
+                </a:solidFill>
+                <a:latin typeface="+mn-lt"/>
+                <a:ea typeface="+mn-ea"/>
+                <a:cs typeface="+mn-cs"/>
+              </a:defRPr>
+            </a:lvl7pPr>
+            <a:lvl8pPr marL="3429000" indent="-228600" algn="l" defTabSz="914400" rtl="0" eaLnBrk="1" latinLnBrk="0" hangingPunct="1">
+              <a:lnSpc>
+                <a:spcPct val="90000"/>
+              </a:lnSpc>
+              <a:spcBef>
+                <a:spcPct val="30000"/>
+              </a:spcBef>
+              <a:buFont typeface="Arial" panose="020B0604020202020204" pitchFamily="34" charset="0"/>
+              <a:buChar char="•"/>
+              <a:defRPr sz="1800" kern="1200">
+                <a:solidFill>
+                  <a:schemeClr val="tx1"/>
+                </a:solidFill>
+                <a:latin typeface="+mn-lt"/>
+                <a:ea typeface="+mn-ea"/>
+                <a:cs typeface="+mn-cs"/>
+              </a:defRPr>
+            </a:lvl8pPr>
+            <a:lvl9pPr marL="3886200" indent="-228600" algn="l" defTabSz="914400" rtl="0" eaLnBrk="1" latinLnBrk="0" hangingPunct="1">
+              <a:lnSpc>
+                <a:spcPct val="90000"/>
+              </a:lnSpc>
+              <a:spcBef>
+                <a:spcPct val="30000"/>
+              </a:spcBef>
+              <a:buFont typeface="Arial" panose="020B0604020202020204" pitchFamily="34" charset="0"/>
+              <a:buChar char="•"/>
+              <a:defRPr sz="1800" kern="1200">
+                <a:solidFill>
+                  <a:schemeClr val="tx1"/>
+                </a:solidFill>
+                <a:latin typeface="+mn-lt"/>
+                <a:ea typeface="+mn-ea"/>
+                <a:cs typeface="+mn-cs"/>
+              </a:defRPr>
+            </a:lvl9pPr>
+          </a:lstStyle>
+          <a:p>
+            <a:pPr marL="0" indent="0">
+              <a:spcAft>
+                <a:spcPts val="450"/>
+              </a:spcAft>
+              <a:buNone/>
+              <a:defRPr/>
+            </a:pPr>
+            <a:endParaRPr lang="zh-CN" altLang="en-US" sz="900" dirty="0">
+              <a:latin typeface="Microsoft YaHei UI" panose="020B0503020204020204" pitchFamily="34" charset="-122"/>
+              <a:ea typeface="Microsoft YaHei UI" panose="020B0503020204020204" pitchFamily="34" charset="-122"/>
+              <a:cs typeface="Segoe UI" panose="020B0502040204020203" pitchFamily="34" charset="0"/>
+            </a:endParaRPr>
+          </a:p>
+        </p:txBody>
+      </p:sp>
+      <p:sp>
+        <p:nvSpPr>
+          <p:cNvPr id="2" name="矩形 1">
+            <a:extLst>
+              <a:ext uri="{FF2B5EF4-FFF2-40B4-BE49-F238E27FC236}">
+                <a16:creationId xmlns:a16="http://schemas.microsoft.com/office/drawing/2014/main" id="{61913634-122C-430D-BE79-95FE908A90D7}"/>
+              </a:ext>
+            </a:extLst>
+          </p:cNvPr>
+          <p:cNvSpPr/>
+          <p:nvPr/>
+        </p:nvSpPr>
+        <p:spPr>
+          <a:xfrm>
+            <a:off x="351020" y="1367235"/>
+            <a:ext cx="8386771" cy="4189993"/>
+          </a:xfrm>
+          <a:prstGeom prst="rect">
+            <a:avLst/>
+          </a:prstGeom>
+        </p:spPr>
+        <p:txBody>
+          <a:bodyPr wrap="square">
+            <a:spAutoFit/>
+          </a:bodyPr>
+          <a:lstStyle/>
+          <a:p>
+            <a:pPr marL="342900" indent="-342900">
+              <a:lnSpc>
+                <a:spcPct val="150000"/>
+              </a:lnSpc>
+              <a:buClr>
+                <a:srgbClr val="0070C0"/>
+              </a:buClr>
+              <a:buFont typeface="Arial" panose="020B0604020202020204" pitchFamily="34" charset="0"/>
+              <a:buChar char="•"/>
+            </a:pPr>
+            <a:r>
+              <a:rPr lang="en-US" altLang="zh-CN" sz="2000" b="1" dirty="0">
+                <a:latin typeface="Segoe UI (Textkörper)"/>
+              </a:rPr>
+              <a:t>Data processing:</a:t>
+            </a:r>
+          </a:p>
+          <a:p>
+            <a:pPr marL="800100" lvl="1" indent="-342900">
+              <a:lnSpc>
+                <a:spcPct val="150000"/>
+              </a:lnSpc>
+              <a:buClr>
+                <a:srgbClr val="0070C0"/>
+              </a:buClr>
+              <a:buFont typeface="Arial" panose="020B0604020202020204" pitchFamily="34" charset="0"/>
+              <a:buChar char="•"/>
+            </a:pPr>
+            <a:r>
+              <a:rPr lang="en-US" altLang="zh-CN" sz="2000" dirty="0">
+                <a:latin typeface="Segoe UI (Textkörper)"/>
+              </a:rPr>
+              <a:t>Load the data (images with annotations)</a:t>
+            </a:r>
+          </a:p>
+          <a:p>
+            <a:pPr marL="800100" lvl="1" indent="-342900">
+              <a:lnSpc>
+                <a:spcPct val="150000"/>
+              </a:lnSpc>
+              <a:buClr>
+                <a:srgbClr val="0070C0"/>
+              </a:buClr>
+              <a:buFont typeface="Arial" panose="020B0604020202020204" pitchFamily="34" charset="0"/>
+              <a:buChar char="•"/>
+            </a:pPr>
+            <a:r>
+              <a:rPr lang="en-US" altLang="zh-CN" sz="2000" dirty="0">
+                <a:latin typeface="Segoe UI (Textkörper)"/>
+              </a:rPr>
+              <a:t>Augment the data:</a:t>
+            </a:r>
+          </a:p>
+          <a:p>
+            <a:pPr marL="1257300" lvl="2" indent="-342900">
+              <a:lnSpc>
+                <a:spcPct val="150000"/>
+              </a:lnSpc>
+              <a:buClr>
+                <a:srgbClr val="0070C0"/>
+              </a:buClr>
+              <a:buFont typeface="Arial" panose="020B0604020202020204" pitchFamily="34" charset="0"/>
+              <a:buChar char="•"/>
+            </a:pPr>
+            <a:r>
+              <a:rPr lang="en-US" altLang="zh-CN" sz="2000" dirty="0">
+                <a:latin typeface="Segoe UI (Textkörper)"/>
+              </a:rPr>
+              <a:t>Uniform size of 299x299 resolution</a:t>
+            </a:r>
+          </a:p>
+          <a:p>
+            <a:pPr marL="1257300" lvl="2" indent="-342900">
+              <a:lnSpc>
+                <a:spcPct val="150000"/>
+              </a:lnSpc>
+              <a:buClr>
+                <a:srgbClr val="0070C0"/>
+              </a:buClr>
+              <a:buFont typeface="Arial" panose="020B0604020202020204" pitchFamily="34" charset="0"/>
+              <a:buChar char="•"/>
+            </a:pPr>
+            <a:r>
+              <a:rPr lang="en-US" altLang="zh-CN" sz="2000" dirty="0">
+                <a:latin typeface="Segoe UI (Textkörper)"/>
+              </a:rPr>
+              <a:t>For color: brightness, contrast, saturation, hue modifications</a:t>
+            </a:r>
+          </a:p>
+          <a:p>
+            <a:pPr marL="1257300" lvl="2" indent="-342900">
+              <a:lnSpc>
+                <a:spcPct val="150000"/>
+              </a:lnSpc>
+              <a:buClr>
+                <a:srgbClr val="0070C0"/>
+              </a:buClr>
+              <a:buFont typeface="Arial" panose="020B0604020202020204" pitchFamily="34" charset="0"/>
+              <a:buChar char="•"/>
+            </a:pPr>
+            <a:r>
+              <a:rPr lang="en-US" altLang="zh-CN" sz="2000" dirty="0">
+                <a:latin typeface="Segoe UI (Textkörper)"/>
+              </a:rPr>
+              <a:t>For image: Scaling, flipping, center crop</a:t>
+            </a:r>
+          </a:p>
+          <a:p>
+            <a:pPr marL="1257300" lvl="2" indent="-342900">
+              <a:lnSpc>
+                <a:spcPct val="150000"/>
+              </a:lnSpc>
+              <a:buClr>
+                <a:srgbClr val="0070C0"/>
+              </a:buClr>
+              <a:buFont typeface="Arial" panose="020B0604020202020204" pitchFamily="34" charset="0"/>
+              <a:buChar char="•"/>
+            </a:pPr>
+            <a:endParaRPr lang="en-US" altLang="zh-CN" sz="2000" dirty="0">
+              <a:latin typeface="Segoe UI (Textkörper)"/>
+            </a:endParaRPr>
+          </a:p>
+          <a:p>
+            <a:pPr marL="342900" indent="-342900">
+              <a:lnSpc>
+                <a:spcPct val="150000"/>
+              </a:lnSpc>
+              <a:buClr>
+                <a:srgbClr val="0070C0"/>
+              </a:buClr>
+              <a:buFont typeface="Arial" panose="020B0604020202020204" pitchFamily="34" charset="0"/>
+              <a:buChar char="•"/>
+            </a:pPr>
+            <a:r>
+              <a:rPr lang="en-US" altLang="zh-CN" sz="2000" b="1" dirty="0">
+                <a:latin typeface="Segoe UI (Textkörper)"/>
+              </a:rPr>
+              <a:t>Training:</a:t>
+            </a:r>
+          </a:p>
+          <a:p>
+            <a:pPr marL="800100" lvl="1" indent="-342900">
+              <a:lnSpc>
+                <a:spcPct val="150000"/>
+              </a:lnSpc>
+              <a:buClr>
+                <a:srgbClr val="0070C0"/>
+              </a:buClr>
+              <a:buFont typeface="Arial" panose="020B0604020202020204" pitchFamily="34" charset="0"/>
+              <a:buChar char="•"/>
+            </a:pPr>
+            <a:r>
+              <a:rPr lang="en-US" altLang="zh-CN" sz="2000" dirty="0">
+                <a:latin typeface="Segoe UI (Textkörper)"/>
+              </a:rPr>
+              <a:t>Tune hyperparameters, epochs and batch sizes</a:t>
+            </a:r>
+          </a:p>
+        </p:txBody>
+      </p:sp>
+    </p:spTree>
+    <p:extLst>
+      <p:ext uri="{BB962C8B-B14F-4D97-AF65-F5344CB8AC3E}">
+        <p14:creationId xmlns:p14="http://schemas.microsoft.com/office/powerpoint/2010/main" val="2095750614"/>
+      </p:ext>
+    </p:extLst>
+  </p:cSld>
+  <p:clrMapOvr>
+    <a:masterClrMapping/>
+  </p:clrMapOvr>
+  <mc:AlternateContent xmlns:mc="http://schemas.openxmlformats.org/markup-compatibility/2006" xmlns:p14="http://schemas.microsoft.com/office/powerpoint/2010/main">
+    <mc:Choice Requires="p14">
+      <p:transition p14:dur="10"/>
+    </mc:Choice>
+    <mc:Fallback xmlns="">
+      <p:transition/>
+    </mc:Fallback>
+  </mc:AlternateContent>
+</p:sld>
+</file>
+
+<file path=ppt/slides/slide13.xml><?xml version="1.0" encoding="utf-8"?>
+<p:sld xmlns:a="http://schemas.openxmlformats.org/drawingml/2006/main" xmlns:r="http://schemas.openxmlformats.org/officeDocument/2006/relationships" xmlns:p="http://schemas.openxmlformats.org/presentationml/2006/main">
+  <p:cSld>
+    <p:spTree>
+      <p:nvGrpSpPr>
+        <p:cNvPr id="1" name=""/>
+        <p:cNvGrpSpPr/>
+        <p:nvPr/>
+      </p:nvGrpSpPr>
+      <p:grpSpPr>
+        <a:xfrm>
+          <a:off x="0" y="0"/>
+          <a:ext cx="0" cy="0"/>
+          <a:chOff x="0" y="0"/>
+          <a:chExt cx="0" cy="0"/>
+        </a:xfrm>
+      </p:grpSpPr>
+      <p:sp>
+        <p:nvSpPr>
+          <p:cNvPr id="8" name="标题 7"/>
+          <p:cNvSpPr>
+            <a:spLocks noGrp="1"/>
+          </p:cNvSpPr>
+          <p:nvPr>
+            <p:ph type="title"/>
+          </p:nvPr>
+        </p:nvSpPr>
+        <p:spPr/>
+        <p:txBody>
+          <a:bodyPr rtlCol="0">
+            <a:noAutofit/>
+          </a:bodyPr>
+          <a:lstStyle/>
+          <a:p>
+            <a:r>
+              <a:rPr lang="en-US" altLang="zh-CN" b="1" dirty="0"/>
               <a:t>Experiment Results</a:t>
             </a:r>
             <a:endParaRPr lang="zh-CN" altLang="en-US" dirty="0">
@@ -4594,8 +5601,8 @@
         </p:nvSpPr>
         <p:spPr>
           <a:xfrm>
-            <a:off x="7924800" y="1622854"/>
-            <a:ext cx="510746" cy="2139812"/>
+            <a:off x="7974226" y="1729945"/>
+            <a:ext cx="461319" cy="2117945"/>
           </a:xfrm>
           <a:prstGeom prst="rect">
             <a:avLst/>
@@ -4911,7 +5918,7 @@
 </p:sld>
 </file>
 
-<file path=ppt/slides/slide12.xml><?xml version="1.0" encoding="utf-8"?>
+<file path=ppt/slides/slide14.xml><?xml version="1.0" encoding="utf-8"?>
 <p:sld xmlns:a="http://schemas.openxmlformats.org/drawingml/2006/main" xmlns:r="http://schemas.openxmlformats.org/officeDocument/2006/relationships" xmlns:p="http://schemas.openxmlformats.org/presentationml/2006/main">
   <p:cSld>
     <p:spTree>
@@ -5281,7 +6288,7 @@
               <a:rPr lang="en-US" altLang="zh-CN" sz="2000" dirty="0">
                 <a:latin typeface="Segoe UI (Textkörper)"/>
               </a:rPr>
-              <a:t>Much more time required for better training and hyperparameter finetuning</a:t>
+              <a:t>Much more time required for better training and hyperparameter fine tuning</a:t>
             </a:r>
             <a:br>
               <a:rPr lang="en-US" altLang="zh-CN" sz="2000" dirty="0">
@@ -5320,7 +6327,7 @@
 </p:sld>
 </file>
 
-<file path=ppt/slides/slide13.xml><?xml version="1.0" encoding="utf-8"?>
+<file path=ppt/slides/slide15.xml><?xml version="1.0" encoding="utf-8"?>
 <p:sld xmlns:a="http://schemas.openxmlformats.org/drawingml/2006/main" xmlns:r="http://schemas.openxmlformats.org/officeDocument/2006/relationships" xmlns:p="http://schemas.openxmlformats.org/presentationml/2006/main">
   <p:cSld>
     <p:spTree>
@@ -5628,7 +6635,7 @@
 </p:sld>
 </file>
 
-<file path=ppt/slides/slide14.xml><?xml version="1.0" encoding="utf-8"?>
+<file path=ppt/slides/slide16.xml><?xml version="1.0" encoding="utf-8"?>
 <p:sld xmlns:a="http://schemas.openxmlformats.org/drawingml/2006/main" xmlns:r="http://schemas.openxmlformats.org/officeDocument/2006/relationships" xmlns:p="http://schemas.openxmlformats.org/presentationml/2006/main">
   <p:cSld>
     <p:spTree>
@@ -10557,46 +11564,16 @@
               <a:t>Model: </a:t>
             </a:r>
             <a:r>
-              <a:rPr lang="de-DE" sz="2000" dirty="0">
+              <a:rPr lang="en-US" altLang="zh-CN" sz="2000" dirty="0">
                 <a:latin typeface="Segoe UI (Textkörper)"/>
               </a:rPr>
-              <a:t>Inception V3 </a:t>
-            </a:r>
-            <a:r>
-              <a:rPr lang="de-DE" sz="2000" dirty="0" err="1">
+              <a:t>Wide </a:t>
+            </a:r>
+            <a:r>
+              <a:rPr lang="en-US" altLang="zh-CN" sz="2000" dirty="0" err="1">
                 <a:latin typeface="Segoe UI (Textkörper)"/>
               </a:rPr>
-              <a:t>model</a:t>
-            </a:r>
-            <a:r>
-              <a:rPr lang="de-DE" sz="2000" dirty="0">
-                <a:latin typeface="Segoe UI (Textkörper)"/>
-              </a:rPr>
-              <a:t> (</a:t>
-            </a:r>
-            <a:r>
-              <a:rPr lang="de-DE" sz="2000" dirty="0" err="1">
-                <a:latin typeface="Segoe UI (Textkörper)"/>
-              </a:rPr>
-              <a:t>from</a:t>
-            </a:r>
-            <a:r>
-              <a:rPr lang="de-DE" sz="2000" dirty="0">
-                <a:latin typeface="Segoe UI (Textkörper)"/>
-              </a:rPr>
-              <a:t> </a:t>
-            </a:r>
-            <a:r>
-              <a:rPr lang="de-DE" sz="2000" dirty="0" err="1">
-                <a:latin typeface="Segoe UI (Textkörper)"/>
-              </a:rPr>
-              <a:t>TensorFlow</a:t>
-            </a:r>
-            <a:r>
-              <a:rPr lang="de-DE" sz="2000" dirty="0">
-                <a:latin typeface="Segoe UI (Textkörper)"/>
-              </a:rPr>
-              <a:t>)</a:t>
+              <a:t>ResNet</a:t>
             </a:r>
             <a:endParaRPr lang="en-US" altLang="zh-CN" sz="2000" dirty="0">
               <a:latin typeface="Segoe UI (Textkörper)"/>
@@ -10606,55 +11583,38 @@
       </p:sp>
       <p:pic>
         <p:nvPicPr>
-          <p:cNvPr id="2050" name="Picture 2" descr="https://cloud.google.com/tpu/docs/images/inceptionv3onc--oview.png">
+          <p:cNvPr id="3" name="图片 2">
             <a:extLst>
               <a:ext uri="{FF2B5EF4-FFF2-40B4-BE49-F238E27FC236}">
-                <a16:creationId xmlns:a16="http://schemas.microsoft.com/office/drawing/2014/main" id="{A3C47CA6-439A-497A-9A47-7B7B5531B520}"/>
+                <a16:creationId xmlns:a16="http://schemas.microsoft.com/office/drawing/2014/main" id="{52680F42-2FCB-4F98-9A6A-71F4CE578446}"/>
               </a:ext>
             </a:extLst>
           </p:cNvPr>
           <p:cNvPicPr>
-            <a:picLocks noChangeAspect="1" noChangeArrowheads="1"/>
+            <a:picLocks noChangeAspect="1"/>
           </p:cNvPicPr>
           <p:nvPr/>
         </p:nvPicPr>
         <p:blipFill>
-          <a:blip r:embed="rId4">
-            <a:extLst>
-              <a:ext uri="{28A0092B-C50C-407E-A947-70E740481C1C}">
-                <a14:useLocalDpi xmlns:a14="http://schemas.microsoft.com/office/drawing/2010/main" val="0"/>
-              </a:ext>
-            </a:extLst>
-          </a:blip>
-          <a:srcRect/>
+          <a:blip r:embed="rId4"/>
           <a:stretch>
             <a:fillRect/>
           </a:stretch>
         </p:blipFill>
-        <p:spPr bwMode="auto">
+        <p:spPr>
           <a:xfrm>
-            <a:off x="351020" y="2426313"/>
-            <a:ext cx="9144000" cy="3557587"/>
+            <a:off x="629408" y="2764863"/>
+            <a:ext cx="8108383" cy="2872989"/>
           </a:xfrm>
           <a:prstGeom prst="rect">
             <a:avLst/>
           </a:prstGeom>
-          <a:noFill/>
-          <a:extLst>
-            <a:ext uri="{909E8E84-426E-40DD-AFC4-6F175D3DCCD1}">
-              <a14:hiddenFill xmlns:a14="http://schemas.microsoft.com/office/drawing/2010/main">
-                <a:solidFill>
-                  <a:srgbClr val="FFFFFF"/>
-                </a:solidFill>
-              </a14:hiddenFill>
-            </a:ext>
-          </a:extLst>
         </p:spPr>
       </p:pic>
     </p:spTree>
     <p:extLst>
       <p:ext uri="{BB962C8B-B14F-4D97-AF65-F5344CB8AC3E}">
-        <p14:creationId xmlns:p14="http://schemas.microsoft.com/office/powerpoint/2010/main" val="211187460"/>
+        <p14:creationId xmlns:p14="http://schemas.microsoft.com/office/powerpoint/2010/main" val="1356624217"/>
       </p:ext>
     </p:extLst>
   </p:cSld>
@@ -11430,15 +12390,6 @@
 </file>
 
 <file path=customXml/item1.xml><?xml version="1.0" encoding="utf-8"?>
-<?mso-contentType ?>
-<FormTemplates xmlns="http://schemas.microsoft.com/sharepoint/v3/contenttype/forms">
-  <Display>DocumentLibraryForm</Display>
-  <Edit>DocumentLibraryForm</Edit>
-  <New>DocumentLibraryForm</New>
-</FormTemplates>
-</file>
-
-<file path=customXml/item2.xml><?xml version="1.0" encoding="utf-8"?>
 <ct:contentTypeSchema xmlns:ct="http://schemas.microsoft.com/office/2006/metadata/contentType" xmlns:ma="http://schemas.microsoft.com/office/2006/metadata/properties/metaAttributes" ct:_="" ma:_="" ma:contentTypeName="Document" ma:contentTypeID="0x01010079F111ED35F8CC479449609E8A0923A6" ma:contentTypeVersion="12" ma:contentTypeDescription="Create a new document." ma:contentTypeScope="" ma:versionID="a8a52e8c320b9a064ae3583ae3861c92">
   <xsd:schema xmlns:xsd="http://www.w3.org/2001/XMLSchema" xmlns:xs="http://www.w3.org/2001/XMLSchema" xmlns:p="http://schemas.microsoft.com/office/2006/metadata/properties" xmlns:ns2="71af3243-3dd4-4a8d-8c0d-dd76da1f02a5" xmlns:ns3="16c05727-aa75-4e4a-9b5f-8a80a1165891" targetNamespace="http://schemas.microsoft.com/office/2006/metadata/properties" ma:root="true" ma:fieldsID="88020cb39231a0945110f9cd888b521a" ns2:_="" ns3:_="">
     <xsd:import namespace="71af3243-3dd4-4a8d-8c0d-dd76da1f02a5"/>
@@ -11659,6 +12610,15 @@
 </ct:contentTypeSchema>
 </file>
 
+<file path=customXml/item2.xml><?xml version="1.0" encoding="utf-8"?>
+<?mso-contentType ?>
+<FormTemplates xmlns="http://schemas.microsoft.com/sharepoint/v3/contenttype/forms">
+  <Display>DocumentLibraryForm</Display>
+  <Edit>DocumentLibraryForm</Edit>
+  <New>DocumentLibraryForm</New>
+</FormTemplates>
+</file>
+
 <file path=customXml/item3.xml><?xml version="1.0" encoding="utf-8"?>
 <p:properties xmlns:p="http://schemas.microsoft.com/office/2006/metadata/properties" xmlns:xsi="http://www.w3.org/2001/XMLSchema-instance" xmlns:pc="http://schemas.microsoft.com/office/infopath/2007/PartnerControls">
   <documentManagement>
@@ -11669,14 +12629,6 @@
 </file>
 
 <file path=customXml/itemProps1.xml><?xml version="1.0" encoding="utf-8"?>
-<ds:datastoreItem xmlns:ds="http://schemas.openxmlformats.org/officeDocument/2006/customXml" ds:itemID="{7EE8C63A-4744-4DE4-BB49-0FF0B5375C60}">
-  <ds:schemaRefs>
-    <ds:schemaRef ds:uri="http://schemas.microsoft.com/sharepoint/v3/contenttype/forms"/>
-  </ds:schemaRefs>
-</ds:datastoreItem>
-</file>
-
-<file path=customXml/itemProps2.xml><?xml version="1.0" encoding="utf-8"?>
 <ds:datastoreItem xmlns:ds="http://schemas.openxmlformats.org/officeDocument/2006/customXml" ds:itemID="{FD7FC771-7DFE-49DA-B577-71181BFBCB2E}">
   <ds:schemaRefs>
     <ds:schemaRef ds:uri="http://schemas.microsoft.com/office/2006/metadata/contentType"/>
@@ -11691,6 +12643,14 @@
     <ds:schemaRef ds:uri="http://purl.org/dc/elements/1.1/"/>
     <ds:schemaRef ds:uri="http://purl.org/dc/terms/"/>
     <ds:schemaRef ds:uri="http://schemas.microsoft.com/internal/obd"/>
+  </ds:schemaRefs>
+</ds:datastoreItem>
+</file>
+
+<file path=customXml/itemProps2.xml><?xml version="1.0" encoding="utf-8"?>
+<ds:datastoreItem xmlns:ds="http://schemas.openxmlformats.org/officeDocument/2006/customXml" ds:itemID="{7EE8C63A-4744-4DE4-BB49-0FF0B5375C60}">
+  <ds:schemaRefs>
+    <ds:schemaRef ds:uri="http://schemas.microsoft.com/sharepoint/v3/contenttype/forms"/>
   </ds:schemaRefs>
 </ds:datastoreItem>
 </file>

</xml_diff>